<commit_message>
Modify all for final
</commit_message>
<xml_diff>
--- a/misc/docs/slide.pptx
+++ b/misc/docs/slide.pptx
@@ -33,28 +33,29 @@
     <p:sldId id="278" r:id="rId28"/>
     <p:sldId id="279" r:id="rId29"/>
     <p:sldId id="280" r:id="rId30"/>
+    <p:sldId id="281" r:id="rId31"/>
   </p:sldIdLst>
   <p:sldSz cy="5143500" cx="9144000"/>
   <p:notesSz cx="6858000" cy="9144000"/>
   <p:embeddedFontLst>
     <p:embeddedFont>
       <p:font typeface="Roboto Medium"/>
-      <p:regular r:id="rId31"/>
-      <p:bold r:id="rId32"/>
-      <p:italic r:id="rId33"/>
-      <p:boldItalic r:id="rId34"/>
+      <p:regular r:id="rId32"/>
+      <p:bold r:id="rId33"/>
+      <p:italic r:id="rId34"/>
+      <p:boldItalic r:id="rId35"/>
     </p:embeddedFont>
     <p:embeddedFont>
       <p:font typeface="PT Sans Narrow"/>
-      <p:regular r:id="rId35"/>
-      <p:bold r:id="rId36"/>
+      <p:regular r:id="rId36"/>
+      <p:bold r:id="rId37"/>
     </p:embeddedFont>
     <p:embeddedFont>
       <p:font typeface="Open Sans"/>
-      <p:regular r:id="rId37"/>
-      <p:bold r:id="rId38"/>
-      <p:italic r:id="rId39"/>
-      <p:boldItalic r:id="rId40"/>
+      <p:regular r:id="rId38"/>
+      <p:bold r:id="rId39"/>
+      <p:italic r:id="rId40"/>
+      <p:boldItalic r:id="rId41"/>
     </p:embeddedFont>
   </p:embeddedFontLst>
   <p:defaultTextStyle>
@@ -835,7 +836,7 @@
   <p:cSld>
     <p:spTree>
       <p:nvGrpSpPr>
-        <p:cNvPr id="126" name="Shape 126"/>
+        <p:cNvPr id="127" name="Shape 127"/>
         <p:cNvGrpSpPr/>
         <p:nvPr/>
       </p:nvGrpSpPr>
@@ -849,7 +850,7 @@
       </p:grpSpPr>
       <p:sp>
         <p:nvSpPr>
-          <p:cNvPr id="127" name="Google Shape;127;g7c2f4dffc7_0_51:notes"/>
+          <p:cNvPr id="128" name="Google Shape;128;g7c2f4dffc7_0_51:notes"/>
           <p:cNvSpPr/>
           <p:nvPr>
             <p:ph idx="2" type="sldImg"/>
@@ -884,7 +885,7 @@
       </p:sp>
       <p:sp>
         <p:nvSpPr>
-          <p:cNvPr id="128" name="Google Shape;128;g7c2f4dffc7_0_51:notes"/>
+          <p:cNvPr id="129" name="Google Shape;129;g7c2f4dffc7_0_51:notes"/>
           <p:cNvSpPr txBox="1"/>
           <p:nvPr>
             <p:ph idx="1" type="body"/>
@@ -934,7 +935,7 @@
   <p:cSld>
     <p:spTree>
       <p:nvGrpSpPr>
-        <p:cNvPr id="132" name="Shape 132"/>
+        <p:cNvPr id="133" name="Shape 133"/>
         <p:cNvGrpSpPr/>
         <p:nvPr/>
       </p:nvGrpSpPr>
@@ -948,7 +949,7 @@
       </p:grpSpPr>
       <p:sp>
         <p:nvSpPr>
-          <p:cNvPr id="133" name="Google Shape;133;g7c2f4dffc7_0_58:notes"/>
+          <p:cNvPr id="134" name="Google Shape;134;g7c2f4dffc7_0_58:notes"/>
           <p:cNvSpPr/>
           <p:nvPr>
             <p:ph idx="2" type="sldImg"/>
@@ -983,7 +984,7 @@
       </p:sp>
       <p:sp>
         <p:nvSpPr>
-          <p:cNvPr id="134" name="Google Shape;134;g7c2f4dffc7_0_58:notes"/>
+          <p:cNvPr id="135" name="Google Shape;135;g7c2f4dffc7_0_58:notes"/>
           <p:cNvSpPr txBox="1"/>
           <p:nvPr>
             <p:ph idx="1" type="body"/>
@@ -1033,7 +1034,7 @@
   <p:cSld>
     <p:spTree>
       <p:nvGrpSpPr>
-        <p:cNvPr id="138" name="Shape 138"/>
+        <p:cNvPr id="139" name="Shape 139"/>
         <p:cNvGrpSpPr/>
         <p:nvPr/>
       </p:nvGrpSpPr>
@@ -1047,7 +1048,7 @@
       </p:grpSpPr>
       <p:sp>
         <p:nvSpPr>
-          <p:cNvPr id="139" name="Google Shape;139;g7c2f4dffc7_8_282:notes"/>
+          <p:cNvPr id="140" name="Google Shape;140;g7c2f4dffc7_8_282:notes"/>
           <p:cNvSpPr/>
           <p:nvPr>
             <p:ph idx="2" type="sldImg"/>
@@ -1082,7 +1083,7 @@
       </p:sp>
       <p:sp>
         <p:nvSpPr>
-          <p:cNvPr id="140" name="Google Shape;140;g7c2f4dffc7_8_282:notes"/>
+          <p:cNvPr id="141" name="Google Shape;141;g7c2f4dffc7_8_282:notes"/>
           <p:cNvSpPr txBox="1"/>
           <p:nvPr>
             <p:ph idx="1" type="body"/>
@@ -1132,7 +1133,7 @@
   <p:cSld>
     <p:spTree>
       <p:nvGrpSpPr>
-        <p:cNvPr id="144" name="Shape 144"/>
+        <p:cNvPr id="145" name="Shape 145"/>
         <p:cNvGrpSpPr/>
         <p:nvPr/>
       </p:nvGrpSpPr>
@@ -1146,7 +1147,7 @@
       </p:grpSpPr>
       <p:sp>
         <p:nvSpPr>
-          <p:cNvPr id="145" name="Google Shape;145;g7c2f4dffc7_8_287:notes"/>
+          <p:cNvPr id="146" name="Google Shape;146;g7c2f4dffc7_8_287:notes"/>
           <p:cNvSpPr/>
           <p:nvPr>
             <p:ph idx="2" type="sldImg"/>
@@ -1181,7 +1182,7 @@
       </p:sp>
       <p:sp>
         <p:nvSpPr>
-          <p:cNvPr id="146" name="Google Shape;146;g7c2f4dffc7_8_287:notes"/>
+          <p:cNvPr id="147" name="Google Shape;147;g7c2f4dffc7_8_287:notes"/>
           <p:cNvSpPr txBox="1"/>
           <p:nvPr>
             <p:ph idx="1" type="body"/>
@@ -1231,7 +1232,7 @@
   <p:cSld>
     <p:spTree>
       <p:nvGrpSpPr>
-        <p:cNvPr id="150" name="Shape 150"/>
+        <p:cNvPr id="151" name="Shape 151"/>
         <p:cNvGrpSpPr/>
         <p:nvPr/>
       </p:nvGrpSpPr>
@@ -1245,7 +1246,7 @@
       </p:grpSpPr>
       <p:sp>
         <p:nvSpPr>
-          <p:cNvPr id="151" name="Google Shape;151;g7c2f4dffc7_8_292:notes"/>
+          <p:cNvPr id="152" name="Google Shape;152;g7c2f4dffc7_8_292:notes"/>
           <p:cNvSpPr/>
           <p:nvPr>
             <p:ph idx="2" type="sldImg"/>
@@ -1280,7 +1281,7 @@
       </p:sp>
       <p:sp>
         <p:nvSpPr>
-          <p:cNvPr id="152" name="Google Shape;152;g7c2f4dffc7_8_292:notes"/>
+          <p:cNvPr id="153" name="Google Shape;153;g7c2f4dffc7_8_292:notes"/>
           <p:cNvSpPr txBox="1"/>
           <p:nvPr>
             <p:ph idx="1" type="body"/>
@@ -1330,7 +1331,7 @@
   <p:cSld>
     <p:spTree>
       <p:nvGrpSpPr>
-        <p:cNvPr id="156" name="Shape 156"/>
+        <p:cNvPr id="157" name="Shape 157"/>
         <p:cNvGrpSpPr/>
         <p:nvPr/>
       </p:nvGrpSpPr>
@@ -1344,7 +1345,7 @@
       </p:grpSpPr>
       <p:sp>
         <p:nvSpPr>
-          <p:cNvPr id="157" name="Google Shape;157;g7c2f4dffc7_8_297:notes"/>
+          <p:cNvPr id="158" name="Google Shape;158;g7c2f4dffc7_8_297:notes"/>
           <p:cNvSpPr/>
           <p:nvPr>
             <p:ph idx="2" type="sldImg"/>
@@ -1379,7 +1380,7 @@
       </p:sp>
       <p:sp>
         <p:nvSpPr>
-          <p:cNvPr id="158" name="Google Shape;158;g7c2f4dffc7_8_297:notes"/>
+          <p:cNvPr id="159" name="Google Shape;159;g7c2f4dffc7_8_297:notes"/>
           <p:cNvSpPr txBox="1"/>
           <p:nvPr>
             <p:ph idx="1" type="body"/>
@@ -1429,7 +1430,7 @@
   <p:cSld>
     <p:spTree>
       <p:nvGrpSpPr>
-        <p:cNvPr id="162" name="Shape 162"/>
+        <p:cNvPr id="163" name="Shape 163"/>
         <p:cNvGrpSpPr/>
         <p:nvPr/>
       </p:nvGrpSpPr>
@@ -1443,7 +1444,7 @@
       </p:grpSpPr>
       <p:sp>
         <p:nvSpPr>
-          <p:cNvPr id="163" name="Google Shape;163;g7c2f4dffc7_0_33:notes"/>
+          <p:cNvPr id="164" name="Google Shape;164;g7c2f4dffc7_0_33:notes"/>
           <p:cNvSpPr/>
           <p:nvPr>
             <p:ph idx="2" type="sldImg"/>
@@ -1478,7 +1479,7 @@
       </p:sp>
       <p:sp>
         <p:nvSpPr>
-          <p:cNvPr id="164" name="Google Shape;164;g7c2f4dffc7_0_33:notes"/>
+          <p:cNvPr id="165" name="Google Shape;165;g7c2f4dffc7_0_33:notes"/>
           <p:cNvSpPr txBox="1"/>
           <p:nvPr>
             <p:ph idx="1" type="body"/>
@@ -1528,7 +1529,7 @@
   <p:cSld>
     <p:spTree>
       <p:nvGrpSpPr>
-        <p:cNvPr id="169" name="Shape 169"/>
+        <p:cNvPr id="170" name="Shape 170"/>
         <p:cNvGrpSpPr/>
         <p:nvPr/>
       </p:nvGrpSpPr>
@@ -1542,7 +1543,7 @@
       </p:grpSpPr>
       <p:sp>
         <p:nvSpPr>
-          <p:cNvPr id="170" name="Google Shape;170;g7c2f4dffc7_0_63:notes"/>
+          <p:cNvPr id="171" name="Google Shape;171;g7c2f4dffc7_0_63:notes"/>
           <p:cNvSpPr/>
           <p:nvPr>
             <p:ph idx="2" type="sldImg"/>
@@ -1577,7 +1578,7 @@
       </p:sp>
       <p:sp>
         <p:nvSpPr>
-          <p:cNvPr id="171" name="Google Shape;171;g7c2f4dffc7_0_63:notes"/>
+          <p:cNvPr id="172" name="Google Shape;172;g7c2f4dffc7_0_63:notes"/>
           <p:cNvSpPr txBox="1"/>
           <p:nvPr>
             <p:ph idx="1" type="body"/>
@@ -1627,7 +1628,7 @@
   <p:cSld>
     <p:spTree>
       <p:nvGrpSpPr>
-        <p:cNvPr id="176" name="Shape 176"/>
+        <p:cNvPr id="177" name="Shape 177"/>
         <p:cNvGrpSpPr/>
         <p:nvPr/>
       </p:nvGrpSpPr>
@@ -1641,7 +1642,7 @@
       </p:grpSpPr>
       <p:sp>
         <p:nvSpPr>
-          <p:cNvPr id="177" name="Google Shape;177;g7c2f4dffc7_11_1:notes"/>
+          <p:cNvPr id="178" name="Google Shape;178;g7c2f4dffc7_11_1:notes"/>
           <p:cNvSpPr/>
           <p:nvPr>
             <p:ph idx="2" type="sldImg"/>
@@ -1676,7 +1677,7 @@
       </p:sp>
       <p:sp>
         <p:nvSpPr>
-          <p:cNvPr id="178" name="Google Shape;178;g7c2f4dffc7_11_1:notes"/>
+          <p:cNvPr id="179" name="Google Shape;179;g7c2f4dffc7_11_1:notes"/>
           <p:cNvSpPr txBox="1"/>
           <p:nvPr>
             <p:ph idx="1" type="body"/>
@@ -1726,7 +1727,7 @@
   <p:cSld>
     <p:spTree>
       <p:nvGrpSpPr>
-        <p:cNvPr id="187" name="Shape 187"/>
+        <p:cNvPr id="188" name="Shape 188"/>
         <p:cNvGrpSpPr/>
         <p:nvPr/>
       </p:nvGrpSpPr>
@@ -1740,7 +1741,7 @@
       </p:grpSpPr>
       <p:sp>
         <p:nvSpPr>
-          <p:cNvPr id="188" name="Google Shape;188;g7c2f4dffc7_11_8:notes"/>
+          <p:cNvPr id="189" name="Google Shape;189;g6d59e2d689_0_0:notes"/>
           <p:cNvSpPr/>
           <p:nvPr>
             <p:ph idx="2" type="sldImg"/>
@@ -1775,7 +1776,7 @@
       </p:sp>
       <p:sp>
         <p:nvSpPr>
-          <p:cNvPr id="189" name="Google Shape;189;g7c2f4dffc7_11_8:notes"/>
+          <p:cNvPr id="190" name="Google Shape;190;g6d59e2d689_0_0:notes"/>
           <p:cNvSpPr txBox="1"/>
           <p:nvPr>
             <p:ph idx="1" type="body"/>
@@ -1924,7 +1925,7 @@
   <p:cSld>
     <p:spTree>
       <p:nvGrpSpPr>
-        <p:cNvPr id="194" name="Shape 194"/>
+        <p:cNvPr id="196" name="Shape 196"/>
         <p:cNvGrpSpPr/>
         <p:nvPr/>
       </p:nvGrpSpPr>
@@ -1938,7 +1939,7 @@
       </p:grpSpPr>
       <p:sp>
         <p:nvSpPr>
-          <p:cNvPr id="195" name="Google Shape;195;g7c2f4dffc7_0_68:notes"/>
+          <p:cNvPr id="197" name="Google Shape;197;g7c2f4dffc7_11_8:notes"/>
           <p:cNvSpPr/>
           <p:nvPr>
             <p:ph idx="2" type="sldImg"/>
@@ -1973,7 +1974,7 @@
       </p:sp>
       <p:sp>
         <p:nvSpPr>
-          <p:cNvPr id="196" name="Google Shape;196;g7c2f4dffc7_0_68:notes"/>
+          <p:cNvPr id="198" name="Google Shape;198;g7c2f4dffc7_11_8:notes"/>
           <p:cNvSpPr txBox="1"/>
           <p:nvPr>
             <p:ph idx="1" type="body"/>
@@ -2023,7 +2024,7 @@
   <p:cSld>
     <p:spTree>
       <p:nvGrpSpPr>
-        <p:cNvPr id="212" name="Shape 212"/>
+        <p:cNvPr id="203" name="Shape 203"/>
         <p:cNvGrpSpPr/>
         <p:nvPr/>
       </p:nvGrpSpPr>
@@ -2037,7 +2038,7 @@
       </p:grpSpPr>
       <p:sp>
         <p:nvSpPr>
-          <p:cNvPr id="213" name="Google Shape;213;g7c2f4dffc7_0_73:notes"/>
+          <p:cNvPr id="204" name="Google Shape;204;g7c2f4dffc7_0_68:notes"/>
           <p:cNvSpPr/>
           <p:nvPr>
             <p:ph idx="2" type="sldImg"/>
@@ -2072,7 +2073,7 @@
       </p:sp>
       <p:sp>
         <p:nvSpPr>
-          <p:cNvPr id="214" name="Google Shape;214;g7c2f4dffc7_0_73:notes"/>
+          <p:cNvPr id="205" name="Google Shape;205;g7c2f4dffc7_0_68:notes"/>
           <p:cNvSpPr txBox="1"/>
           <p:nvPr>
             <p:ph idx="1" type="body"/>
@@ -2122,7 +2123,7 @@
   <p:cSld>
     <p:spTree>
       <p:nvGrpSpPr>
-        <p:cNvPr id="219" name="Shape 219"/>
+        <p:cNvPr id="221" name="Shape 221"/>
         <p:cNvGrpSpPr/>
         <p:nvPr/>
       </p:nvGrpSpPr>
@@ -2136,7 +2137,7 @@
       </p:grpSpPr>
       <p:sp>
         <p:nvSpPr>
-          <p:cNvPr id="220" name="Google Shape;220;g7c2f4dffc7_11_35:notes"/>
+          <p:cNvPr id="222" name="Google Shape;222;g7c2f4dffc7_0_73:notes"/>
           <p:cNvSpPr/>
           <p:nvPr>
             <p:ph idx="2" type="sldImg"/>
@@ -2171,7 +2172,7 @@
       </p:sp>
       <p:sp>
         <p:nvSpPr>
-          <p:cNvPr id="221" name="Google Shape;221;g7c2f4dffc7_11_35:notes"/>
+          <p:cNvPr id="223" name="Google Shape;223;g7c2f4dffc7_0_73:notes"/>
           <p:cNvSpPr txBox="1"/>
           <p:nvPr>
             <p:ph idx="1" type="body"/>
@@ -2221,7 +2222,7 @@
   <p:cSld>
     <p:spTree>
       <p:nvGrpSpPr>
-        <p:cNvPr id="226" name="Shape 226"/>
+        <p:cNvPr id="228" name="Shape 228"/>
         <p:cNvGrpSpPr/>
         <p:nvPr/>
       </p:nvGrpSpPr>
@@ -2235,7 +2236,7 @@
       </p:grpSpPr>
       <p:sp>
         <p:nvSpPr>
-          <p:cNvPr id="227" name="Google Shape;227;g7c2f4dffc7_11_42:notes"/>
+          <p:cNvPr id="229" name="Google Shape;229;g7c2f4dffc7_11_35:notes"/>
           <p:cNvSpPr/>
           <p:nvPr>
             <p:ph idx="2" type="sldImg"/>
@@ -2270,7 +2271,7 @@
       </p:sp>
       <p:sp>
         <p:nvSpPr>
-          <p:cNvPr id="228" name="Google Shape;228;g7c2f4dffc7_11_42:notes"/>
+          <p:cNvPr id="230" name="Google Shape;230;g7c2f4dffc7_11_35:notes"/>
           <p:cNvSpPr txBox="1"/>
           <p:nvPr>
             <p:ph idx="1" type="body"/>
@@ -2320,7 +2321,7 @@
   <p:cSld>
     <p:spTree>
       <p:nvGrpSpPr>
-        <p:cNvPr id="233" name="Shape 233"/>
+        <p:cNvPr id="235" name="Shape 235"/>
         <p:cNvGrpSpPr/>
         <p:nvPr/>
       </p:nvGrpSpPr>
@@ -2334,7 +2335,7 @@
       </p:grpSpPr>
       <p:sp>
         <p:nvSpPr>
-          <p:cNvPr id="234" name="Google Shape;234;g7c2f4dffc7_8_307:notes"/>
+          <p:cNvPr id="236" name="Google Shape;236;g7c2f4dffc7_11_42:notes"/>
           <p:cNvSpPr/>
           <p:nvPr>
             <p:ph idx="2" type="sldImg"/>
@@ -2369,7 +2370,7 @@
       </p:sp>
       <p:sp>
         <p:nvSpPr>
-          <p:cNvPr id="235" name="Google Shape;235;g7c2f4dffc7_8_307:notes"/>
+          <p:cNvPr id="237" name="Google Shape;237;g7c2f4dffc7_11_42:notes"/>
           <p:cNvSpPr txBox="1"/>
           <p:nvPr>
             <p:ph idx="1" type="body"/>
@@ -2419,7 +2420,7 @@
   <p:cSld>
     <p:spTree>
       <p:nvGrpSpPr>
-        <p:cNvPr id="240" name="Shape 240"/>
+        <p:cNvPr id="242" name="Shape 242"/>
         <p:cNvGrpSpPr/>
         <p:nvPr/>
       </p:nvGrpSpPr>
@@ -2433,7 +2434,7 @@
       </p:grpSpPr>
       <p:sp>
         <p:nvSpPr>
-          <p:cNvPr id="241" name="Google Shape;241;g7c2f4dffc7_8_302:notes"/>
+          <p:cNvPr id="243" name="Google Shape;243;g7c2f4dffc7_8_307:notes"/>
           <p:cNvSpPr/>
           <p:nvPr>
             <p:ph idx="2" type="sldImg"/>
@@ -2468,7 +2469,106 @@
       </p:sp>
       <p:sp>
         <p:nvSpPr>
-          <p:cNvPr id="242" name="Google Shape;242;g7c2f4dffc7_8_302:notes"/>
+          <p:cNvPr id="244" name="Google Shape;244;g7c2f4dffc7_8_307:notes"/>
+          <p:cNvSpPr txBox="1"/>
+          <p:nvPr>
+            <p:ph idx="1" type="body"/>
+          </p:nvPr>
+        </p:nvSpPr>
+        <p:spPr>
+          <a:xfrm>
+            <a:off x="685800" y="4343400"/>
+            <a:ext cx="5486400" cy="4114800"/>
+          </a:xfrm>
+          <a:prstGeom prst="rect">
+            <a:avLst/>
+          </a:prstGeom>
+        </p:spPr>
+        <p:txBody>
+          <a:bodyPr anchorCtr="0" anchor="t" bIns="91425" lIns="91425" spcFirstLastPara="1" rIns="91425" wrap="square" tIns="91425">
+            <a:noAutofit/>
+          </a:bodyPr>
+          <a:lstStyle/>
+          <a:p>
+            <a:pPr indent="0" lvl="0" marL="0" rtl="0" algn="l">
+              <a:spcBef>
+                <a:spcPts val="0"/>
+              </a:spcBef>
+              <a:spcAft>
+                <a:spcPts val="0"/>
+              </a:spcAft>
+              <a:buNone/>
+            </a:pPr>
+            <a:r>
+              <a:t/>
+            </a:r>
+            <a:endParaRPr/>
+          </a:p>
+        </p:txBody>
+      </p:sp>
+    </p:spTree>
+  </p:cSld>
+  <p:clrMapOvr>
+    <a:masterClrMapping/>
+  </p:clrMapOvr>
+</p:notes>
+</file>
+
+<file path=ppt/notesSlides/notesSlide26.xml><?xml version="1.0" encoding="utf-8"?>
+<p:notes xmlns:a="http://schemas.openxmlformats.org/drawingml/2006/main" xmlns:r="http://schemas.openxmlformats.org/officeDocument/2006/relationships" xmlns:mc="http://schemas.openxmlformats.org/markup-compatibility/2006" xmlns:mv="urn:schemas-microsoft-com:mac:vml" xmlns:p="http://schemas.openxmlformats.org/presentationml/2006/main" xmlns:c="http://schemas.openxmlformats.org/drawingml/2006/chart" xmlns:dgm="http://schemas.openxmlformats.org/drawingml/2006/diagram" xmlns:o="urn:schemas-microsoft-com:office:office" xmlns:v="urn:schemas-microsoft-com:vml" xmlns:pvml="urn:schemas-microsoft-com:office:powerpoint" xmlns:com="http://schemas.openxmlformats.org/drawingml/2006/compatibility" xmlns:p14="http://schemas.microsoft.com/office/powerpoint/2010/main" xmlns:p15="http://schemas.microsoft.com/office/powerpoint/2012/main" showMasterPhAnim="0" showMasterSp="0">
+  <p:cSld>
+    <p:spTree>
+      <p:nvGrpSpPr>
+        <p:cNvPr id="249" name="Shape 249"/>
+        <p:cNvGrpSpPr/>
+        <p:nvPr/>
+      </p:nvGrpSpPr>
+      <p:grpSpPr>
+        <a:xfrm>
+          <a:off x="0" y="0"/>
+          <a:ext cx="0" cy="0"/>
+          <a:chOff x="0" y="0"/>
+          <a:chExt cx="0" cy="0"/>
+        </a:xfrm>
+      </p:grpSpPr>
+      <p:sp>
+        <p:nvSpPr>
+          <p:cNvPr id="250" name="Google Shape;250;g7c2f4dffc7_8_302:notes"/>
+          <p:cNvSpPr/>
+          <p:nvPr>
+            <p:ph idx="2" type="sldImg"/>
+          </p:nvPr>
+        </p:nvSpPr>
+        <p:spPr>
+          <a:xfrm>
+            <a:off x="381300" y="685800"/>
+            <a:ext cx="6096000" cy="3429000"/>
+          </a:xfrm>
+          <a:custGeom>
+            <a:rect b="b" l="l" r="r" t="t"/>
+            <a:pathLst>
+              <a:path extrusionOk="0" h="120000" w="120000">
+                <a:moveTo>
+                  <a:pt x="0" y="0"/>
+                </a:moveTo>
+                <a:lnTo>
+                  <a:pt x="120000" y="0"/>
+                </a:lnTo>
+                <a:lnTo>
+                  <a:pt x="120000" y="120000"/>
+                </a:lnTo>
+                <a:lnTo>
+                  <a:pt x="0" y="120000"/>
+                </a:lnTo>
+                <a:close/>
+              </a:path>
+            </a:pathLst>
+          </a:custGeom>
+        </p:spPr>
+      </p:sp>
+      <p:sp>
+        <p:nvSpPr>
+          <p:cNvPr id="251" name="Google Shape;251;g7c2f4dffc7_8_302:notes"/>
           <p:cNvSpPr txBox="1"/>
           <p:nvPr>
             <p:ph idx="1" type="body"/>
@@ -3013,7 +3113,7 @@
   <p:cSld>
     <p:spTree>
       <p:nvGrpSpPr>
-        <p:cNvPr id="113" name="Shape 113"/>
+        <p:cNvPr id="114" name="Shape 114"/>
         <p:cNvGrpSpPr/>
         <p:nvPr/>
       </p:nvGrpSpPr>
@@ -3027,7 +3127,7 @@
       </p:grpSpPr>
       <p:sp>
         <p:nvSpPr>
-          <p:cNvPr id="114" name="Google Shape;114;g7c2f4dffc7_8_267:notes"/>
+          <p:cNvPr id="115" name="Google Shape;115;g7c2f4dffc7_8_267:notes"/>
           <p:cNvSpPr/>
           <p:nvPr>
             <p:ph idx="2" type="sldImg"/>
@@ -3062,7 +3162,7 @@
       </p:sp>
       <p:sp>
         <p:nvSpPr>
-          <p:cNvPr id="115" name="Google Shape;115;g7c2f4dffc7_8_267:notes"/>
+          <p:cNvPr id="116" name="Google Shape;116;g7c2f4dffc7_8_267:notes"/>
           <p:cNvSpPr txBox="1"/>
           <p:nvPr>
             <p:ph idx="1" type="body"/>
@@ -3112,7 +3212,7 @@
   <p:cSld>
     <p:spTree>
       <p:nvGrpSpPr>
-        <p:cNvPr id="120" name="Shape 120"/>
+        <p:cNvPr id="121" name="Shape 121"/>
         <p:cNvGrpSpPr/>
         <p:nvPr/>
       </p:nvGrpSpPr>
@@ -3126,7 +3226,7 @@
       </p:grpSpPr>
       <p:sp>
         <p:nvSpPr>
-          <p:cNvPr id="121" name="Google Shape;121;g7c2f4dffc7_0_43:notes"/>
+          <p:cNvPr id="122" name="Google Shape;122;g7c2f4dffc7_0_43:notes"/>
           <p:cNvSpPr/>
           <p:nvPr>
             <p:ph idx="2" type="sldImg"/>
@@ -3161,7 +3261,7 @@
       </p:sp>
       <p:sp>
         <p:nvSpPr>
-          <p:cNvPr id="122" name="Google Shape;122;g7c2f4dffc7_0_43:notes"/>
+          <p:cNvPr id="123" name="Google Shape;123;g7c2f4dffc7_0_43:notes"/>
           <p:cNvSpPr txBox="1"/>
           <p:nvPr>
             <p:ph idx="1" type="body"/>
@@ -8823,7 +8923,7 @@
   <p:cSld>
     <p:spTree>
       <p:nvGrpSpPr>
-        <p:cNvPr id="129" name="Shape 129"/>
+        <p:cNvPr id="130" name="Shape 130"/>
         <p:cNvGrpSpPr/>
         <p:nvPr/>
       </p:nvGrpSpPr>
@@ -8837,7 +8937,7 @@
       </p:grpSpPr>
       <p:pic>
         <p:nvPicPr>
-          <p:cNvPr id="130" name="Google Shape;130;p22"/>
+          <p:cNvPr id="131" name="Google Shape;131;p22"/>
           <p:cNvPicPr preferRelativeResize="0"/>
           <p:nvPr/>
         </p:nvPicPr>
@@ -8865,7 +8965,7 @@
       </p:pic>
       <p:sp>
         <p:nvSpPr>
-          <p:cNvPr id="131" name="Google Shape;131;p22"/>
+          <p:cNvPr id="132" name="Google Shape;132;p22"/>
           <p:cNvSpPr txBox="1"/>
           <p:nvPr>
             <p:ph idx="12" type="sldNum"/>
@@ -8926,7 +9026,7 @@
   <p:cSld>
     <p:spTree>
       <p:nvGrpSpPr>
-        <p:cNvPr id="135" name="Shape 135"/>
+        <p:cNvPr id="136" name="Shape 136"/>
         <p:cNvGrpSpPr/>
         <p:nvPr/>
       </p:nvGrpSpPr>
@@ -8940,7 +9040,7 @@
       </p:grpSpPr>
       <p:sp>
         <p:nvSpPr>
-          <p:cNvPr id="136" name="Google Shape;136;p23"/>
+          <p:cNvPr id="137" name="Google Shape;137;p23"/>
           <p:cNvSpPr txBox="1"/>
           <p:nvPr>
             <p:ph idx="12" type="sldNum"/>
@@ -8990,7 +9090,7 @@
       </p:sp>
       <p:pic>
         <p:nvPicPr>
-          <p:cNvPr id="137" name="Google Shape;137;p23"/>
+          <p:cNvPr id="138" name="Google Shape;138;p23"/>
           <p:cNvPicPr preferRelativeResize="0"/>
           <p:nvPr/>
         </p:nvPicPr>
@@ -9004,8 +9104,8 @@
         </p:blipFill>
         <p:spPr>
           <a:xfrm>
-            <a:off x="2073150" y="635275"/>
-            <a:ext cx="4997696" cy="3872950"/>
+            <a:off x="2005725" y="685775"/>
+            <a:ext cx="5132549" cy="3977450"/>
           </a:xfrm>
           <a:prstGeom prst="rect">
             <a:avLst/>
@@ -9029,7 +9129,7 @@
   <p:cSld>
     <p:spTree>
       <p:nvGrpSpPr>
-        <p:cNvPr id="141" name="Shape 141"/>
+        <p:cNvPr id="142" name="Shape 142"/>
         <p:cNvGrpSpPr/>
         <p:nvPr/>
       </p:nvGrpSpPr>
@@ -9043,7 +9143,7 @@
       </p:grpSpPr>
       <p:sp>
         <p:nvSpPr>
-          <p:cNvPr id="142" name="Google Shape;142;p24"/>
+          <p:cNvPr id="143" name="Google Shape;143;p24"/>
           <p:cNvSpPr txBox="1"/>
           <p:nvPr>
             <p:ph idx="12" type="sldNum"/>
@@ -9093,7 +9193,7 @@
       </p:sp>
       <p:pic>
         <p:nvPicPr>
-          <p:cNvPr id="143" name="Google Shape;143;p24"/>
+          <p:cNvPr id="144" name="Google Shape;144;p24"/>
           <p:cNvPicPr preferRelativeResize="0"/>
           <p:nvPr/>
         </p:nvPicPr>
@@ -9132,7 +9232,7 @@
   <p:cSld>
     <p:spTree>
       <p:nvGrpSpPr>
-        <p:cNvPr id="147" name="Shape 147"/>
+        <p:cNvPr id="148" name="Shape 148"/>
         <p:cNvGrpSpPr/>
         <p:nvPr/>
       </p:nvGrpSpPr>
@@ -9146,7 +9246,7 @@
       </p:grpSpPr>
       <p:sp>
         <p:nvSpPr>
-          <p:cNvPr id="148" name="Google Shape;148;p25"/>
+          <p:cNvPr id="149" name="Google Shape;149;p25"/>
           <p:cNvSpPr txBox="1"/>
           <p:nvPr>
             <p:ph idx="12" type="sldNum"/>
@@ -9196,7 +9296,7 @@
       </p:sp>
       <p:pic>
         <p:nvPicPr>
-          <p:cNvPr id="149" name="Google Shape;149;p25"/>
+          <p:cNvPr id="150" name="Google Shape;150;p25"/>
           <p:cNvPicPr preferRelativeResize="0"/>
           <p:nvPr/>
         </p:nvPicPr>
@@ -9235,7 +9335,7 @@
   <p:cSld>
     <p:spTree>
       <p:nvGrpSpPr>
-        <p:cNvPr id="153" name="Shape 153"/>
+        <p:cNvPr id="154" name="Shape 154"/>
         <p:cNvGrpSpPr/>
         <p:nvPr/>
       </p:nvGrpSpPr>
@@ -9249,7 +9349,7 @@
       </p:grpSpPr>
       <p:sp>
         <p:nvSpPr>
-          <p:cNvPr id="154" name="Google Shape;154;p26"/>
+          <p:cNvPr id="155" name="Google Shape;155;p26"/>
           <p:cNvSpPr txBox="1"/>
           <p:nvPr>
             <p:ph idx="12" type="sldNum"/>
@@ -9299,7 +9399,7 @@
       </p:sp>
       <p:pic>
         <p:nvPicPr>
-          <p:cNvPr id="155" name="Google Shape;155;p26"/>
+          <p:cNvPr id="156" name="Google Shape;156;p26"/>
           <p:cNvPicPr preferRelativeResize="0"/>
           <p:nvPr/>
         </p:nvPicPr>
@@ -9338,7 +9438,7 @@
   <p:cSld>
     <p:spTree>
       <p:nvGrpSpPr>
-        <p:cNvPr id="159" name="Shape 159"/>
+        <p:cNvPr id="160" name="Shape 160"/>
         <p:cNvGrpSpPr/>
         <p:nvPr/>
       </p:nvGrpSpPr>
@@ -9352,7 +9452,7 @@
       </p:grpSpPr>
       <p:sp>
         <p:nvSpPr>
-          <p:cNvPr id="160" name="Google Shape;160;p27"/>
+          <p:cNvPr id="161" name="Google Shape;161;p27"/>
           <p:cNvSpPr txBox="1"/>
           <p:nvPr>
             <p:ph idx="12" type="sldNum"/>
@@ -9402,7 +9502,7 @@
       </p:sp>
       <p:pic>
         <p:nvPicPr>
-          <p:cNvPr id="161" name="Google Shape;161;p27"/>
+          <p:cNvPr id="162" name="Google Shape;162;p27"/>
           <p:cNvPicPr preferRelativeResize="0"/>
           <p:nvPr/>
         </p:nvPicPr>
@@ -9416,8 +9516,8 @@
         </p:blipFill>
         <p:spPr>
           <a:xfrm>
-            <a:off x="2128550" y="711650"/>
-            <a:ext cx="4886900" cy="3720200"/>
+            <a:off x="2130400" y="811825"/>
+            <a:ext cx="4883201" cy="3712125"/>
           </a:xfrm>
           <a:prstGeom prst="rect">
             <a:avLst/>
@@ -9441,7 +9541,7 @@
   <p:cSld>
     <p:spTree>
       <p:nvGrpSpPr>
-        <p:cNvPr id="165" name="Shape 165"/>
+        <p:cNvPr id="166" name="Shape 166"/>
         <p:cNvGrpSpPr/>
         <p:nvPr/>
       </p:nvGrpSpPr>
@@ -9455,7 +9555,7 @@
       </p:grpSpPr>
       <p:sp>
         <p:nvSpPr>
-          <p:cNvPr id="166" name="Google Shape;166;p28"/>
+          <p:cNvPr id="167" name="Google Shape;167;p28"/>
           <p:cNvSpPr txBox="1"/>
           <p:nvPr>
             <p:ph type="title"/>
@@ -9505,7 +9605,7 @@
       </p:sp>
       <p:sp>
         <p:nvSpPr>
-          <p:cNvPr id="167" name="Google Shape;167;p28"/>
+          <p:cNvPr id="168" name="Google Shape;168;p28"/>
           <p:cNvSpPr txBox="1"/>
           <p:nvPr>
             <p:ph idx="1" type="body"/>
@@ -9580,28 +9680,11 @@
             </a:r>
             <a:endParaRPr sz="2000"/>
           </a:p>
-          <a:p>
-            <a:pPr indent="-355600" lvl="0" marL="457200" rtl="0" algn="l">
-              <a:spcBef>
-                <a:spcPts val="0"/>
-              </a:spcBef>
-              <a:spcAft>
-                <a:spcPts val="0"/>
-              </a:spcAft>
-              <a:buSzPts val="2000"/>
-              <a:buChar char="●"/>
-            </a:pPr>
-            <a:r>
-              <a:rPr lang="en" sz="2000"/>
-              <a:t>Xóa các dòng có giá trị thiếu</a:t>
-            </a:r>
-            <a:endParaRPr sz="2000"/>
-          </a:p>
         </p:txBody>
       </p:sp>
       <p:sp>
         <p:nvSpPr>
-          <p:cNvPr id="168" name="Google Shape;168;p28"/>
+          <p:cNvPr id="169" name="Google Shape;169;p28"/>
           <p:cNvSpPr txBox="1"/>
           <p:nvPr>
             <p:ph idx="12" type="sldNum"/>
@@ -9662,7 +9745,7 @@
   <p:cSld>
     <p:spTree>
       <p:nvGrpSpPr>
-        <p:cNvPr id="172" name="Shape 172"/>
+        <p:cNvPr id="173" name="Shape 173"/>
         <p:cNvGrpSpPr/>
         <p:nvPr/>
       </p:nvGrpSpPr>
@@ -9676,7 +9759,7 @@
       </p:grpSpPr>
       <p:sp>
         <p:nvSpPr>
-          <p:cNvPr id="173" name="Google Shape;173;p29"/>
+          <p:cNvPr id="174" name="Google Shape;174;p29"/>
           <p:cNvSpPr txBox="1"/>
           <p:nvPr>
             <p:ph type="title"/>
@@ -9735,7 +9818,7 @@
       </p:sp>
       <p:sp>
         <p:nvSpPr>
-          <p:cNvPr id="174" name="Google Shape;174;p29"/>
+          <p:cNvPr id="175" name="Google Shape;175;p29"/>
           <p:cNvSpPr txBox="1"/>
           <p:nvPr>
             <p:ph idx="1" type="body"/>
@@ -9952,7 +10035,7 @@
       </p:sp>
       <p:sp>
         <p:nvSpPr>
-          <p:cNvPr id="175" name="Google Shape;175;p29"/>
+          <p:cNvPr id="176" name="Google Shape;176;p29"/>
           <p:cNvSpPr txBox="1"/>
           <p:nvPr>
             <p:ph idx="12" type="sldNum"/>
@@ -10013,7 +10096,7 @@
   <p:cSld>
     <p:spTree>
       <p:nvGrpSpPr>
-        <p:cNvPr id="179" name="Shape 179"/>
+        <p:cNvPr id="180" name="Shape 180"/>
         <p:cNvGrpSpPr/>
         <p:nvPr/>
       </p:nvGrpSpPr>
@@ -10027,7 +10110,7 @@
       </p:grpSpPr>
       <p:sp>
         <p:nvSpPr>
-          <p:cNvPr id="180" name="Google Shape;180;p30"/>
+          <p:cNvPr id="181" name="Google Shape;181;p30"/>
           <p:cNvSpPr txBox="1"/>
           <p:nvPr>
             <p:ph type="title"/>
@@ -10077,7 +10160,7 @@
       </p:sp>
       <p:sp>
         <p:nvSpPr>
-          <p:cNvPr id="181" name="Google Shape;181;p30"/>
+          <p:cNvPr id="182" name="Google Shape;182;p30"/>
           <p:cNvSpPr txBox="1"/>
           <p:nvPr>
             <p:ph idx="1" type="body"/>
@@ -10147,7 +10230,7 @@
       </p:sp>
       <p:sp>
         <p:nvSpPr>
-          <p:cNvPr id="182" name="Google Shape;182;p30"/>
+          <p:cNvPr id="183" name="Google Shape;183;p30"/>
           <p:cNvSpPr txBox="1"/>
           <p:nvPr>
             <p:ph idx="12" type="sldNum"/>
@@ -10197,7 +10280,7 @@
       </p:sp>
       <p:sp>
         <p:nvSpPr>
-          <p:cNvPr id="183" name="Google Shape;183;p30"/>
+          <p:cNvPr id="184" name="Google Shape;184;p30"/>
           <p:cNvSpPr/>
           <p:nvPr/>
         </p:nvSpPr>
@@ -10281,7 +10364,7 @@
       </p:sp>
       <p:sp>
         <p:nvSpPr>
-          <p:cNvPr id="184" name="Google Shape;184;p30"/>
+          <p:cNvPr id="185" name="Google Shape;185;p30"/>
           <p:cNvSpPr/>
           <p:nvPr/>
         </p:nvSpPr>
@@ -10333,14 +10416,253 @@
       </p:sp>
       <p:sp>
         <p:nvSpPr>
-          <p:cNvPr id="185" name="Google Shape;185;p30"/>
+          <p:cNvPr id="186" name="Google Shape;186;p30"/>
+          <p:cNvSpPr txBox="1"/>
+          <p:nvPr/>
+        </p:nvSpPr>
+        <p:spPr>
+          <a:xfrm>
+            <a:off x="864900" y="4152450"/>
+            <a:ext cx="4654200" cy="572700"/>
+          </a:xfrm>
+          <a:prstGeom prst="rect">
+            <a:avLst/>
+          </a:prstGeom>
+          <a:noFill/>
+          <a:ln>
+            <a:noFill/>
+          </a:ln>
+        </p:spPr>
+        <p:txBody>
+          <a:bodyPr anchorCtr="0" anchor="t" bIns="91425" lIns="91425" spcFirstLastPara="1" rIns="91425" wrap="square" tIns="91425">
+            <a:noAutofit/>
+          </a:bodyPr>
+          <a:lstStyle/>
+          <a:p>
+            <a:pPr indent="0" lvl="0" marL="0" rtl="0" algn="l">
+              <a:spcBef>
+                <a:spcPts val="0"/>
+              </a:spcBef>
+              <a:spcAft>
+                <a:spcPts val="0"/>
+              </a:spcAft>
+              <a:buNone/>
+            </a:pPr>
+            <a:r>
+              <a:rPr lang="en" sz="1800"/>
+              <a:t>V</a:t>
+            </a:r>
+            <a:r>
+              <a:rPr lang="en" sz="1800"/>
+              <a:t>ới Dij là từ thứ j trong document thứ i</a:t>
+            </a:r>
+            <a:endParaRPr sz="1800"/>
+          </a:p>
+        </p:txBody>
+      </p:sp>
+      <p:sp>
+        <p:nvSpPr>
+          <p:cNvPr id="187" name="Google Shape;187;p30"/>
+          <p:cNvSpPr txBox="1"/>
+          <p:nvPr/>
+        </p:nvSpPr>
+        <p:spPr>
+          <a:xfrm>
+            <a:off x="4807000" y="2547725"/>
+            <a:ext cx="3893700" cy="985500"/>
+          </a:xfrm>
+          <a:prstGeom prst="rect">
+            <a:avLst/>
+          </a:prstGeom>
+          <a:noFill/>
+          <a:ln>
+            <a:noFill/>
+          </a:ln>
+        </p:spPr>
+        <p:txBody>
+          <a:bodyPr anchorCtr="0" anchor="t" bIns="91425" lIns="91425" spcFirstLastPara="1" rIns="91425" wrap="square" tIns="91425">
+            <a:noAutofit/>
+          </a:bodyPr>
+          <a:lstStyle/>
+          <a:p>
+            <a:pPr indent="0" lvl="0" marL="0" rtl="0" algn="l">
+              <a:spcBef>
+                <a:spcPts val="0"/>
+              </a:spcBef>
+              <a:spcAft>
+                <a:spcPts val="0"/>
+              </a:spcAft>
+              <a:buNone/>
+            </a:pPr>
+            <a:r>
+              <a:rPr lang="en" sz="2400">
+                <a:latin typeface="Open Sans"/>
+                <a:ea typeface="Open Sans"/>
+                <a:cs typeface="Open Sans"/>
+                <a:sym typeface="Open Sans"/>
+              </a:rPr>
+              <a:t>Tập từ vựng:</a:t>
+            </a:r>
+            <a:endParaRPr sz="2400">
+              <a:latin typeface="Open Sans"/>
+              <a:ea typeface="Open Sans"/>
+              <a:cs typeface="Open Sans"/>
+              <a:sym typeface="Open Sans"/>
+            </a:endParaRPr>
+          </a:p>
+          <a:p>
+            <a:pPr indent="0" lvl="0" marL="0" rtl="0" algn="l">
+              <a:spcBef>
+                <a:spcPts val="0"/>
+              </a:spcBef>
+              <a:spcAft>
+                <a:spcPts val="0"/>
+              </a:spcAft>
+              <a:buNone/>
+            </a:pPr>
+            <a:r>
+              <a:rPr lang="en" sz="2400">
+                <a:latin typeface="Open Sans"/>
+                <a:ea typeface="Open Sans"/>
+                <a:cs typeface="Open Sans"/>
+                <a:sym typeface="Open Sans"/>
+              </a:rPr>
+              <a:t>[A1, A2, A3, A4]</a:t>
+            </a:r>
+            <a:endParaRPr sz="2400">
+              <a:latin typeface="Open Sans"/>
+              <a:ea typeface="Open Sans"/>
+              <a:cs typeface="Open Sans"/>
+              <a:sym typeface="Open Sans"/>
+            </a:endParaRPr>
+          </a:p>
+        </p:txBody>
+      </p:sp>
+    </p:spTree>
+  </p:cSld>
+  <p:clrMapOvr>
+    <a:masterClrMapping/>
+  </p:clrMapOvr>
+</p:sld>
+</file>
+
+<file path=ppt/slides/slide19.xml><?xml version="1.0" encoding="utf-8"?>
+<p:sld xmlns:a="http://schemas.openxmlformats.org/drawingml/2006/main" xmlns:r="http://schemas.openxmlformats.org/officeDocument/2006/relationships" xmlns:mc="http://schemas.openxmlformats.org/markup-compatibility/2006" xmlns:mv="urn:schemas-microsoft-com:mac:vml" xmlns:p="http://schemas.openxmlformats.org/presentationml/2006/main" xmlns:c="http://schemas.openxmlformats.org/drawingml/2006/chart" xmlns:dgm="http://schemas.openxmlformats.org/drawingml/2006/diagram" xmlns:o="urn:schemas-microsoft-com:office:office" xmlns:v="urn:schemas-microsoft-com:vml" xmlns:pvml="urn:schemas-microsoft-com:office:powerpoint" xmlns:com="http://schemas.openxmlformats.org/drawingml/2006/compatibility" xmlns:p14="http://schemas.microsoft.com/office/powerpoint/2010/main" xmlns:p15="http://schemas.microsoft.com/office/powerpoint/2012/main">
+  <p:cSld>
+    <p:spTree>
+      <p:nvGrpSpPr>
+        <p:cNvPr id="191" name="Shape 191"/>
+        <p:cNvGrpSpPr/>
+        <p:nvPr/>
+      </p:nvGrpSpPr>
+      <p:grpSpPr>
+        <a:xfrm>
+          <a:off x="0" y="0"/>
+          <a:ext cx="0" cy="0"/>
+          <a:chOff x="0" y="0"/>
+          <a:chExt cx="0" cy="0"/>
+        </a:xfrm>
+      </p:grpSpPr>
+      <p:sp>
+        <p:nvSpPr>
+          <p:cNvPr id="192" name="Google Shape;192;p31"/>
+          <p:cNvSpPr txBox="1"/>
+          <p:nvPr>
+            <p:ph idx="12" type="sldNum"/>
+          </p:nvPr>
+        </p:nvSpPr>
+        <p:spPr>
+          <a:xfrm>
+            <a:off x="8472458" y="4663217"/>
+            <a:ext cx="548700" cy="393600"/>
+          </a:xfrm>
+          <a:prstGeom prst="rect">
+            <a:avLst/>
+          </a:prstGeom>
+        </p:spPr>
+        <p:txBody>
+          <a:bodyPr anchorCtr="0" anchor="ctr" bIns="91425" lIns="91425" spcFirstLastPara="1" rIns="91425" wrap="square" tIns="91425">
+            <a:noAutofit/>
+          </a:bodyPr>
+          <a:lstStyle/>
+          <a:p>
+            <a:pPr indent="0" lvl="0" marL="0" rtl="0" algn="r">
+              <a:spcBef>
+                <a:spcPts val="0"/>
+              </a:spcBef>
+              <a:spcAft>
+                <a:spcPts val="0"/>
+              </a:spcAft>
+              <a:buNone/>
+            </a:pPr>
+            <a:fld id="{00000000-1234-1234-1234-123412341234}" type="slidenum">
+              <a:rPr lang="en"/>
+              <a:t>‹#›</a:t>
+            </a:fld>
+            <a:endParaRPr/>
+          </a:p>
+        </p:txBody>
+      </p:sp>
+      <p:sp>
+        <p:nvSpPr>
+          <p:cNvPr id="193" name="Google Shape;193;p31"/>
+          <p:cNvSpPr txBox="1"/>
+          <p:nvPr>
+            <p:ph type="title"/>
+          </p:nvPr>
+        </p:nvSpPr>
+        <p:spPr>
+          <a:xfrm>
+            <a:off x="311700" y="445025"/>
+            <a:ext cx="8520600" cy="707400"/>
+          </a:xfrm>
+          <a:prstGeom prst="rect">
+            <a:avLst/>
+          </a:prstGeom>
+        </p:spPr>
+        <p:txBody>
+          <a:bodyPr anchorCtr="0" anchor="t" bIns="91425" lIns="91425" spcFirstLastPara="1" rIns="91425" wrap="square" tIns="91425">
+            <a:noAutofit/>
+          </a:bodyPr>
+          <a:lstStyle/>
+          <a:p>
+            <a:pPr indent="0" lvl="0" marL="0" rtl="0" algn="l">
+              <a:spcBef>
+                <a:spcPts val="0"/>
+              </a:spcBef>
+              <a:spcAft>
+                <a:spcPts val="0"/>
+              </a:spcAft>
+              <a:buNone/>
+            </a:pPr>
+            <a:r>
+              <a:rPr b="0" lang="en">
+                <a:latin typeface="Roboto Medium"/>
+                <a:ea typeface="Roboto Medium"/>
+                <a:cs typeface="Roboto Medium"/>
+                <a:sym typeface="Roboto Medium"/>
+              </a:rPr>
+              <a:t>Chọn các đặc trưng - TF-IDF</a:t>
+            </a:r>
+            <a:endParaRPr b="0">
+              <a:latin typeface="Roboto Medium"/>
+              <a:ea typeface="Roboto Medium"/>
+              <a:cs typeface="Roboto Medium"/>
+              <a:sym typeface="Roboto Medium"/>
+            </a:endParaRPr>
+          </a:p>
+        </p:txBody>
+      </p:sp>
+      <p:sp>
+        <p:nvSpPr>
+          <p:cNvPr id="194" name="Google Shape;194;p31"/>
           <p:cNvSpPr/>
           <p:nvPr/>
         </p:nvSpPr>
         <p:spPr>
           <a:xfrm>
-            <a:off x="4358000" y="2091175"/>
-            <a:ext cx="3808200" cy="1906800"/>
+            <a:off x="172300" y="2230700"/>
+            <a:ext cx="8875200" cy="1906800"/>
           </a:xfrm>
           <a:prstGeom prst="bracketPair">
             <a:avLst/>
@@ -10377,23 +10699,31 @@
             </a:r>
             <a:r>
               <a:rPr lang="en" sz="1800"/>
-              <a:t>D11)  </a:t>
+              <a:t>A1, </a:t>
             </a:r>
             <a:r>
               <a:rPr lang="en" sz="1800"/>
-              <a:t>tf-idf(</a:t>
+              <a:t>D1, D)		tf-idf(</a:t>
             </a:r>
             <a:r>
               <a:rPr lang="en" sz="1800"/>
-              <a:t>D12) 	</a:t>
+              <a:t>A2, </a:t>
             </a:r>
             <a:r>
               <a:rPr lang="en" sz="1800"/>
-              <a:t>tf-idf(</a:t>
+              <a:t>D1, D) 		tf-idf(</a:t>
             </a:r>
             <a:r>
               <a:rPr lang="en" sz="1800"/>
-              <a:t>D13)</a:t>
+              <a:t>A3, </a:t>
+            </a:r>
+            <a:r>
+              <a:rPr lang="en" sz="1800"/>
+              <a:t>D1, D)		tf-</a:t>
+            </a:r>
+            <a:r>
+              <a:rPr lang="en" sz="1800"/>
+              <a:t>idf(A4, D1, D)</a:t>
             </a:r>
             <a:endParaRPr sz="1800"/>
           </a:p>
@@ -10405,16 +10735,26 @@
               <a:spcAft>
                 <a:spcPts val="0"/>
               </a:spcAft>
-              <a:buClr>
-                <a:schemeClr val="dk1"/>
-              </a:buClr>
-              <a:buSzPts val="1100"/>
-              <a:buFont typeface="Arial"/>
+              <a:buNone/>
+            </a:pPr>
+            <a:r>
+              <a:t/>
+            </a:r>
+            <a:endParaRPr sz="1800"/>
+          </a:p>
+          <a:p>
+            <a:pPr indent="0" lvl="0" marL="0" rtl="0" algn="l">
+              <a:spcBef>
+                <a:spcPts val="0"/>
+              </a:spcBef>
+              <a:spcAft>
+                <a:spcPts val="0"/>
+              </a:spcAft>
               <a:buNone/>
             </a:pPr>
             <a:r>
               <a:rPr lang="en" sz="1800"/>
-              <a:t>tf-idf(D21)  tf-idf(D22) 	tf-idf(D23)</a:t>
+              <a:t>tf-idf(A1, D2, D)		tf-idf(A2, D2, D)		tf-idf(A3, D2, D)		tf-idf(A4, D2, D)</a:t>
             </a:r>
             <a:endParaRPr sz="1800"/>
           </a:p>
@@ -10426,16 +10766,26 @@
               <a:spcAft>
                 <a:spcPts val="0"/>
               </a:spcAft>
-              <a:buClr>
-                <a:schemeClr val="dk1"/>
-              </a:buClr>
-              <a:buSzPts val="1100"/>
-              <a:buFont typeface="Arial"/>
+              <a:buNone/>
+            </a:pPr>
+            <a:r>
+              <a:t/>
+            </a:r>
+            <a:endParaRPr sz="1800"/>
+          </a:p>
+          <a:p>
+            <a:pPr indent="0" lvl="0" marL="0" rtl="0" algn="l">
+              <a:spcBef>
+                <a:spcPts val="0"/>
+              </a:spcBef>
+              <a:spcAft>
+                <a:spcPts val="0"/>
+              </a:spcAft>
               <a:buNone/>
             </a:pPr>
             <a:r>
               <a:rPr lang="en" sz="1800"/>
-              <a:t>tf-idf(D31)  tf-idf(D32) 	tf-idf(D33)</a:t>
+              <a:t>tf-idf(A1, D3, D)		tf-idf(A2, D3, D)		tf-idf(A3, D3, D)		tf-idf(A4, D3, D)</a:t>
             </a:r>
             <a:endParaRPr sz="1800"/>
           </a:p>
@@ -10443,14 +10793,14 @@
       </p:sp>
       <p:sp>
         <p:nvSpPr>
-          <p:cNvPr id="186" name="Google Shape;186;p30"/>
+          <p:cNvPr id="195" name="Google Shape;195;p31"/>
           <p:cNvSpPr txBox="1"/>
           <p:nvPr/>
         </p:nvSpPr>
         <p:spPr>
           <a:xfrm>
-            <a:off x="864900" y="4152450"/>
-            <a:ext cx="4654200" cy="572700"/>
+            <a:off x="563500" y="1390775"/>
+            <a:ext cx="8092800" cy="498600"/>
           </a:xfrm>
           <a:prstGeom prst="rect">
             <a:avLst/>
@@ -10476,313 +10826,33 @@
               <a:buNone/>
             </a:pPr>
             <a:r>
-              <a:rPr lang="en" sz="1800"/>
-              <a:t>V</a:t>
-            </a:r>
-            <a:r>
-              <a:rPr lang="en" sz="1800"/>
-              <a:t>ới Dij là từ thứ j trong document thứ i</a:t>
-            </a:r>
-            <a:endParaRPr sz="1800"/>
-          </a:p>
-        </p:txBody>
-      </p:sp>
-    </p:spTree>
-  </p:cSld>
-  <p:clrMapOvr>
-    <a:masterClrMapping/>
-  </p:clrMapOvr>
-</p:sld>
-</file>
-
-<file path=ppt/slides/slide19.xml><?xml version="1.0" encoding="utf-8"?>
-<p:sld xmlns:a="http://schemas.openxmlformats.org/drawingml/2006/main" xmlns:r="http://schemas.openxmlformats.org/officeDocument/2006/relationships" xmlns:mc="http://schemas.openxmlformats.org/markup-compatibility/2006" xmlns:mv="urn:schemas-microsoft-com:mac:vml" xmlns:p="http://schemas.openxmlformats.org/presentationml/2006/main" xmlns:c="http://schemas.openxmlformats.org/drawingml/2006/chart" xmlns:dgm="http://schemas.openxmlformats.org/drawingml/2006/diagram" xmlns:o="urn:schemas-microsoft-com:office:office" xmlns:v="urn:schemas-microsoft-com:vml" xmlns:pvml="urn:schemas-microsoft-com:office:powerpoint" xmlns:com="http://schemas.openxmlformats.org/drawingml/2006/compatibility" xmlns:p14="http://schemas.microsoft.com/office/powerpoint/2010/main" xmlns:p15="http://schemas.microsoft.com/office/powerpoint/2012/main">
-  <p:cSld>
-    <p:spTree>
-      <p:nvGrpSpPr>
-        <p:cNvPr id="190" name="Shape 190"/>
-        <p:cNvGrpSpPr/>
-        <p:nvPr/>
-      </p:nvGrpSpPr>
-      <p:grpSpPr>
-        <a:xfrm>
-          <a:off x="0" y="0"/>
-          <a:ext cx="0" cy="0"/>
-          <a:chOff x="0" y="0"/>
-          <a:chExt cx="0" cy="0"/>
-        </a:xfrm>
-      </p:grpSpPr>
-      <p:sp>
-        <p:nvSpPr>
-          <p:cNvPr id="191" name="Google Shape;191;p31"/>
-          <p:cNvSpPr txBox="1"/>
-          <p:nvPr>
-            <p:ph type="title"/>
-          </p:nvPr>
-        </p:nvSpPr>
-        <p:spPr>
-          <a:xfrm>
-            <a:off x="311700" y="445025"/>
-            <a:ext cx="8520600" cy="707400"/>
-          </a:xfrm>
-          <a:prstGeom prst="rect">
-            <a:avLst/>
-          </a:prstGeom>
-        </p:spPr>
-        <p:txBody>
-          <a:bodyPr anchorCtr="0" anchor="t" bIns="91425" lIns="91425" spcFirstLastPara="1" rIns="91425" wrap="square" tIns="91425">
-            <a:noAutofit/>
-          </a:bodyPr>
-          <a:lstStyle/>
-          <a:p>
-            <a:pPr indent="0" lvl="0" marL="0" rtl="0" algn="l">
-              <a:spcBef>
-                <a:spcPts val="0"/>
-              </a:spcBef>
-              <a:spcAft>
-                <a:spcPts val="0"/>
-              </a:spcAft>
-              <a:buClr>
-                <a:schemeClr val="dk1"/>
-              </a:buClr>
-              <a:buSzPts val="1100"/>
-              <a:buFont typeface="Arial"/>
-              <a:buNone/>
-            </a:pPr>
-            <a:r>
-              <a:rPr b="0" lang="en">
-                <a:latin typeface="Roboto Medium"/>
-                <a:ea typeface="Roboto Medium"/>
-                <a:cs typeface="Roboto Medium"/>
-                <a:sym typeface="Roboto Medium"/>
-              </a:rPr>
-              <a:t>Chọn các đặc trưng - TF-IDF</a:t>
-            </a:r>
-            <a:endParaRPr b="0">
-              <a:latin typeface="Roboto Medium"/>
-              <a:ea typeface="Roboto Medium"/>
-              <a:cs typeface="Roboto Medium"/>
-              <a:sym typeface="Roboto Medium"/>
-            </a:endParaRPr>
-          </a:p>
-          <a:p>
-            <a:pPr indent="0" lvl="0" marL="0" rtl="0" algn="l">
-              <a:spcBef>
-                <a:spcPts val="0"/>
-              </a:spcBef>
-              <a:spcAft>
-                <a:spcPts val="0"/>
-              </a:spcAft>
-              <a:buNone/>
-            </a:pPr>
-            <a:r>
-              <a:t/>
-            </a:r>
-            <a:endParaRPr/>
-          </a:p>
-        </p:txBody>
-      </p:sp>
-      <p:sp>
-        <p:nvSpPr>
-          <p:cNvPr id="192" name="Google Shape;192;p31"/>
-          <p:cNvSpPr txBox="1"/>
-          <p:nvPr>
-            <p:ph idx="1" type="body"/>
-          </p:nvPr>
-        </p:nvSpPr>
-        <p:spPr>
-          <a:xfrm>
-            <a:off x="311700" y="1266325"/>
-            <a:ext cx="8520600" cy="3302700"/>
-          </a:xfrm>
-          <a:prstGeom prst="rect">
-            <a:avLst/>
-          </a:prstGeom>
-        </p:spPr>
-        <p:txBody>
-          <a:bodyPr anchorCtr="0" anchor="t" bIns="91425" lIns="91425" spcFirstLastPara="1" rIns="91425" wrap="square" tIns="91425">
-            <a:noAutofit/>
-          </a:bodyPr>
-          <a:lstStyle/>
-          <a:p>
-            <a:pPr indent="0" lvl="0" marL="0" rtl="0" algn="l">
-              <a:spcBef>
-                <a:spcPts val="0"/>
-              </a:spcBef>
-              <a:spcAft>
-                <a:spcPts val="0"/>
-              </a:spcAft>
-              <a:buNone/>
-            </a:pPr>
-            <a:r>
-              <a:rPr lang="en" u="sng"/>
-              <a:t>Cách tính:</a:t>
-            </a:r>
-            <a:endParaRPr u="sng"/>
-          </a:p>
-          <a:p>
-            <a:pPr indent="457200" lvl="0" marL="0" rtl="0" algn="l">
-              <a:spcBef>
-                <a:spcPts val="1600"/>
-              </a:spcBef>
-              <a:spcAft>
-                <a:spcPts val="0"/>
-              </a:spcAft>
-              <a:buNone/>
-            </a:pPr>
-            <a:r>
-              <a:rPr b="1" lang="en">
-                <a:solidFill>
-                  <a:srgbClr val="000000"/>
-                </a:solidFill>
-              </a:rPr>
-              <a:t>tf-idf(Dij) = tf(Dij) * idf(Dij)</a:t>
-            </a:r>
-            <a:endParaRPr b="1">
-              <a:solidFill>
-                <a:srgbClr val="000000"/>
-              </a:solidFill>
-            </a:endParaRPr>
-          </a:p>
-          <a:p>
-            <a:pPr indent="0" lvl="0" marL="0" rtl="0" algn="l">
-              <a:spcBef>
-                <a:spcPts val="1600"/>
-              </a:spcBef>
-              <a:spcAft>
-                <a:spcPts val="0"/>
-              </a:spcAft>
-              <a:buNone/>
-            </a:pPr>
-            <a:r>
-              <a:rPr lang="en" u="sng"/>
-              <a:t>Trong đó:</a:t>
-            </a:r>
-            <a:endParaRPr u="sng"/>
-          </a:p>
-          <a:p>
-            <a:pPr indent="457200" lvl="0" marL="0" rtl="0" algn="l">
-              <a:spcBef>
-                <a:spcPts val="1600"/>
-              </a:spcBef>
-              <a:spcAft>
-                <a:spcPts val="1600"/>
-              </a:spcAft>
-              <a:buNone/>
-            </a:pPr>
-            <a:r>
-              <a:rPr b="1" lang="en">
-                <a:solidFill>
-                  <a:srgbClr val="000000"/>
-                </a:solidFill>
-              </a:rPr>
-              <a:t>tf(Dij) = </a:t>
-            </a:r>
-            <a:r>
-              <a:rPr lang="en">
-                <a:solidFill>
-                  <a:srgbClr val="000000"/>
-                </a:solidFill>
-              </a:rPr>
-              <a:t>Số lần xuất hiện của </a:t>
-            </a:r>
-            <a:r>
-              <a:rPr b="1" lang="en">
-                <a:solidFill>
-                  <a:srgbClr val="000000"/>
-                </a:solidFill>
-              </a:rPr>
-              <a:t>từ Dij </a:t>
-            </a:r>
-            <a:r>
-              <a:rPr lang="en">
-                <a:solidFill>
-                  <a:srgbClr val="000000"/>
-                </a:solidFill>
-              </a:rPr>
-              <a:t>trong </a:t>
-            </a:r>
-            <a:r>
-              <a:rPr b="1" lang="en">
-                <a:solidFill>
-                  <a:srgbClr val="000000"/>
-                </a:solidFill>
-              </a:rPr>
-              <a:t>document Di</a:t>
-            </a:r>
-            <a:br>
-              <a:rPr lang="en">
-                <a:solidFill>
-                  <a:srgbClr val="000000"/>
-                </a:solidFill>
-              </a:rPr>
-            </a:br>
-            <a:r>
-              <a:rPr b="1" lang="en">
-                <a:solidFill>
-                  <a:srgbClr val="000000"/>
-                </a:solidFill>
-              </a:rPr>
-              <a:t>	idf(Dij) =</a:t>
-            </a:r>
-            <a:r>
-              <a:rPr lang="en">
-                <a:solidFill>
-                  <a:srgbClr val="000000"/>
-                </a:solidFill>
-              </a:rPr>
-              <a:t> ln(Tổng số document / Số document mà Dij xuất hiện)</a:t>
-            </a:r>
-            <a:endParaRPr>
-              <a:solidFill>
-                <a:srgbClr val="000000"/>
-              </a:solidFill>
-            </a:endParaRPr>
-          </a:p>
-        </p:txBody>
-      </p:sp>
-      <p:sp>
-        <p:nvSpPr>
-          <p:cNvPr id="193" name="Google Shape;193;p31"/>
-          <p:cNvSpPr txBox="1"/>
-          <p:nvPr>
-            <p:ph idx="12" type="sldNum"/>
-          </p:nvPr>
-        </p:nvSpPr>
-        <p:spPr>
-          <a:xfrm>
-            <a:off x="8472458" y="4663217"/>
-            <a:ext cx="548700" cy="393600"/>
-          </a:xfrm>
-          <a:prstGeom prst="rect">
-            <a:avLst/>
-          </a:prstGeom>
-        </p:spPr>
-        <p:txBody>
-          <a:bodyPr anchorCtr="0" anchor="ctr" bIns="91425" lIns="91425" spcFirstLastPara="1" rIns="91425" wrap="square" tIns="91425">
-            <a:noAutofit/>
-          </a:bodyPr>
-          <a:lstStyle/>
-          <a:p>
-            <a:pPr indent="0" lvl="0" marL="0" rtl="0" algn="r">
-              <a:spcBef>
-                <a:spcPts val="0"/>
-              </a:spcBef>
-              <a:spcAft>
-                <a:spcPts val="0"/>
-              </a:spcAft>
-              <a:buNone/>
-            </a:pPr>
-            <a:fld id="{00000000-1234-1234-1234-123412341234}" type="slidenum">
-              <a:rPr lang="en">
+              <a:rPr lang="en" sz="1800">
                 <a:latin typeface="Open Sans"/>
                 <a:ea typeface="Open Sans"/>
                 <a:cs typeface="Open Sans"/>
                 <a:sym typeface="Open Sans"/>
               </a:rPr>
-              <a:t>‹#›</a:t>
-            </a:fld>
-            <a:endParaRPr>
+              <a:t>Kết quả thu được sau khi chọn đặc trưng</a:t>
+            </a:r>
+            <a:r>
+              <a:rPr b="1" lang="en" sz="1800">
+                <a:latin typeface="Open Sans"/>
+                <a:ea typeface="Open Sans"/>
+                <a:cs typeface="Open Sans"/>
+                <a:sym typeface="Open Sans"/>
+              </a:rPr>
+              <a:t> tf-idf</a:t>
+            </a:r>
+            <a:r>
+              <a:rPr lang="en" sz="1800">
+                <a:latin typeface="Open Sans"/>
+                <a:ea typeface="Open Sans"/>
+                <a:cs typeface="Open Sans"/>
+                <a:sym typeface="Open Sans"/>
+              </a:rPr>
+              <a:t>:</a:t>
+            </a:r>
+            <a:endParaRPr sz="1800">
               <a:latin typeface="Open Sans"/>
               <a:ea typeface="Open Sans"/>
               <a:cs typeface="Open Sans"/>
@@ -11089,7 +11159,7 @@
   <p:cSld>
     <p:spTree>
       <p:nvGrpSpPr>
-        <p:cNvPr id="197" name="Shape 197"/>
+        <p:cNvPr id="199" name="Shape 199"/>
         <p:cNvGrpSpPr/>
         <p:nvPr/>
       </p:nvGrpSpPr>
@@ -11103,7 +11173,7 @@
       </p:grpSpPr>
       <p:sp>
         <p:nvSpPr>
-          <p:cNvPr id="198" name="Google Shape;198;p32"/>
+          <p:cNvPr id="200" name="Google Shape;200;p32"/>
           <p:cNvSpPr txBox="1"/>
           <p:nvPr>
             <p:ph type="title"/>
@@ -11131,6 +11201,11 @@
               <a:spcAft>
                 <a:spcPts val="0"/>
               </a:spcAft>
+              <a:buClr>
+                <a:schemeClr val="dk1"/>
+              </a:buClr>
+              <a:buSzPts val="1100"/>
+              <a:buFont typeface="Arial"/>
               <a:buNone/>
             </a:pPr>
             <a:r>
@@ -11140,16 +11215,7 @@
                 <a:cs typeface="Roboto Medium"/>
                 <a:sym typeface="Roboto Medium"/>
               </a:rPr>
-              <a:t>Th</a:t>
-            </a:r>
-            <a:r>
-              <a:rPr b="0" lang="en">
-                <a:latin typeface="Roboto Medium"/>
-                <a:ea typeface="Roboto Medium"/>
-                <a:cs typeface="Roboto Medium"/>
-                <a:sym typeface="Roboto Medium"/>
-              </a:rPr>
-              <a:t>iết kế mô hình</a:t>
+              <a:t>Chọn các đặc trưng - TF-IDF</a:t>
             </a:r>
             <a:endParaRPr b="0">
               <a:latin typeface="Roboto Medium"/>
@@ -11158,11 +11224,233 @@
               <a:sym typeface="Roboto Medium"/>
             </a:endParaRPr>
           </a:p>
+          <a:p>
+            <a:pPr indent="0" lvl="0" marL="0" rtl="0" algn="l">
+              <a:spcBef>
+                <a:spcPts val="0"/>
+              </a:spcBef>
+              <a:spcAft>
+                <a:spcPts val="0"/>
+              </a:spcAft>
+              <a:buNone/>
+            </a:pPr>
+            <a:r>
+              <a:t/>
+            </a:r>
+            <a:endParaRPr/>
+          </a:p>
         </p:txBody>
       </p:sp>
       <p:sp>
         <p:nvSpPr>
-          <p:cNvPr id="199" name="Google Shape;199;p32"/>
+          <p:cNvPr id="201" name="Google Shape;201;p32"/>
+          <p:cNvSpPr txBox="1"/>
+          <p:nvPr>
+            <p:ph idx="1" type="body"/>
+          </p:nvPr>
+        </p:nvSpPr>
+        <p:spPr>
+          <a:xfrm>
+            <a:off x="311700" y="1266325"/>
+            <a:ext cx="8520600" cy="3302700"/>
+          </a:xfrm>
+          <a:prstGeom prst="rect">
+            <a:avLst/>
+          </a:prstGeom>
+        </p:spPr>
+        <p:txBody>
+          <a:bodyPr anchorCtr="0" anchor="t" bIns="91425" lIns="91425" spcFirstLastPara="1" rIns="91425" wrap="square" tIns="91425">
+            <a:noAutofit/>
+          </a:bodyPr>
+          <a:lstStyle/>
+          <a:p>
+            <a:pPr indent="0" lvl="0" marL="0" rtl="0" algn="l">
+              <a:spcBef>
+                <a:spcPts val="0"/>
+              </a:spcBef>
+              <a:spcAft>
+                <a:spcPts val="0"/>
+              </a:spcAft>
+              <a:buNone/>
+            </a:pPr>
+            <a:r>
+              <a:rPr lang="en" u="sng"/>
+              <a:t>Cách tính:</a:t>
+            </a:r>
+            <a:endParaRPr u="sng"/>
+          </a:p>
+          <a:p>
+            <a:pPr indent="457200" lvl="0" marL="0" rtl="0" algn="l">
+              <a:spcBef>
+                <a:spcPts val="1600"/>
+              </a:spcBef>
+              <a:spcAft>
+                <a:spcPts val="0"/>
+              </a:spcAft>
+              <a:buNone/>
+            </a:pPr>
+            <a:r>
+              <a:rPr b="1" lang="en">
+                <a:solidFill>
+                  <a:srgbClr val="000000"/>
+                </a:solidFill>
+              </a:rPr>
+              <a:t>tf-idf(A, Di, D) = tf(A, Di) * idf(A, D)</a:t>
+            </a:r>
+            <a:endParaRPr b="1">
+              <a:solidFill>
+                <a:srgbClr val="000000"/>
+              </a:solidFill>
+            </a:endParaRPr>
+          </a:p>
+          <a:p>
+            <a:pPr indent="0" lvl="0" marL="0" rtl="0" algn="l">
+              <a:spcBef>
+                <a:spcPts val="1600"/>
+              </a:spcBef>
+              <a:spcAft>
+                <a:spcPts val="0"/>
+              </a:spcAft>
+              <a:buNone/>
+            </a:pPr>
+            <a:r>
+              <a:rPr lang="en" u="sng"/>
+              <a:t>Trong đó:</a:t>
+            </a:r>
+            <a:endParaRPr u="sng"/>
+          </a:p>
+          <a:p>
+            <a:pPr indent="457200" lvl="0" marL="0" rtl="0" algn="l">
+              <a:spcBef>
+                <a:spcPts val="1600"/>
+              </a:spcBef>
+              <a:spcAft>
+                <a:spcPts val="1600"/>
+              </a:spcAft>
+              <a:buNone/>
+            </a:pPr>
+            <a:r>
+              <a:rPr b="1" lang="en">
+                <a:solidFill>
+                  <a:srgbClr val="000000"/>
+                </a:solidFill>
+              </a:rPr>
+              <a:t>tf(A, Di) = </a:t>
+            </a:r>
+            <a:r>
+              <a:rPr lang="en">
+                <a:solidFill>
+                  <a:srgbClr val="000000"/>
+                </a:solidFill>
+              </a:rPr>
+              <a:t>Số lần xuất hiện của </a:t>
+            </a:r>
+            <a:r>
+              <a:rPr b="1" lang="en">
+                <a:solidFill>
+                  <a:srgbClr val="000000"/>
+                </a:solidFill>
+              </a:rPr>
+              <a:t>từ A </a:t>
+            </a:r>
+            <a:r>
+              <a:rPr lang="en">
+                <a:solidFill>
+                  <a:srgbClr val="000000"/>
+                </a:solidFill>
+              </a:rPr>
+              <a:t>trong </a:t>
+            </a:r>
+            <a:r>
+              <a:rPr b="1" lang="en">
+                <a:solidFill>
+                  <a:srgbClr val="000000"/>
+                </a:solidFill>
+              </a:rPr>
+              <a:t>document Di</a:t>
+            </a:r>
+            <a:br>
+              <a:rPr lang="en">
+                <a:solidFill>
+                  <a:srgbClr val="000000"/>
+                </a:solidFill>
+              </a:rPr>
+            </a:br>
+            <a:r>
+              <a:rPr b="1" lang="en">
+                <a:solidFill>
+                  <a:srgbClr val="000000"/>
+                </a:solidFill>
+              </a:rPr>
+              <a:t>	idf(A, D) =</a:t>
+            </a:r>
+            <a:r>
+              <a:rPr lang="en">
+                <a:solidFill>
+                  <a:srgbClr val="000000"/>
+                </a:solidFill>
+              </a:rPr>
+              <a:t> ln(Tổng số document </a:t>
+            </a:r>
+            <a:r>
+              <a:rPr b="1" lang="en">
+                <a:solidFill>
+                  <a:srgbClr val="000000"/>
+                </a:solidFill>
+              </a:rPr>
+              <a:t>trong D</a:t>
+            </a:r>
+            <a:r>
+              <a:rPr lang="en">
+                <a:solidFill>
+                  <a:srgbClr val="000000"/>
+                </a:solidFill>
+              </a:rPr>
+              <a:t> / Số document </a:t>
+            </a:r>
+            <a:r>
+              <a:rPr b="1" lang="en">
+                <a:solidFill>
+                  <a:srgbClr val="000000"/>
+                </a:solidFill>
+              </a:rPr>
+              <a:t>trong D</a:t>
+            </a:r>
+            <a:r>
+              <a:rPr lang="en">
+                <a:solidFill>
+                  <a:srgbClr val="000000"/>
+                </a:solidFill>
+              </a:rPr>
+              <a:t> mà </a:t>
+            </a:r>
+            <a:r>
+              <a:rPr b="1" lang="en">
+                <a:solidFill>
+                  <a:srgbClr val="000000"/>
+                </a:solidFill>
+              </a:rPr>
+              <a:t>từ A</a:t>
+            </a:r>
+            <a:r>
+              <a:rPr lang="en">
+                <a:solidFill>
+                  <a:srgbClr val="000000"/>
+                </a:solidFill>
+              </a:rPr>
+              <a:t> xuất hiện)</a:t>
+            </a:r>
+            <a:endParaRPr>
+              <a:solidFill>
+                <a:srgbClr val="000000"/>
+              </a:solidFill>
+            </a:endParaRPr>
+          </a:p>
+        </p:txBody>
+      </p:sp>
+      <p:sp>
+        <p:nvSpPr>
+          <p:cNvPr id="202" name="Google Shape;202;p32"/>
           <p:cNvSpPr txBox="1"/>
           <p:nvPr>
             <p:ph idx="12" type="sldNum"/>
@@ -11210,9 +11498,143 @@
           </a:p>
         </p:txBody>
       </p:sp>
-      <p:sp>
-        <p:nvSpPr>
-          <p:cNvPr id="200" name="Google Shape;200;p32"/>
+    </p:spTree>
+  </p:cSld>
+  <p:clrMapOvr>
+    <a:masterClrMapping/>
+  </p:clrMapOvr>
+</p:sld>
+</file>
+
+<file path=ppt/slides/slide21.xml><?xml version="1.0" encoding="utf-8"?>
+<p:sld xmlns:a="http://schemas.openxmlformats.org/drawingml/2006/main" xmlns:r="http://schemas.openxmlformats.org/officeDocument/2006/relationships" xmlns:mc="http://schemas.openxmlformats.org/markup-compatibility/2006" xmlns:mv="urn:schemas-microsoft-com:mac:vml" xmlns:p="http://schemas.openxmlformats.org/presentationml/2006/main" xmlns:c="http://schemas.openxmlformats.org/drawingml/2006/chart" xmlns:dgm="http://schemas.openxmlformats.org/drawingml/2006/diagram" xmlns:o="urn:schemas-microsoft-com:office:office" xmlns:v="urn:schemas-microsoft-com:vml" xmlns:pvml="urn:schemas-microsoft-com:office:powerpoint" xmlns:com="http://schemas.openxmlformats.org/drawingml/2006/compatibility" xmlns:p14="http://schemas.microsoft.com/office/powerpoint/2010/main" xmlns:p15="http://schemas.microsoft.com/office/powerpoint/2012/main">
+  <p:cSld>
+    <p:spTree>
+      <p:nvGrpSpPr>
+        <p:cNvPr id="206" name="Shape 206"/>
+        <p:cNvGrpSpPr/>
+        <p:nvPr/>
+      </p:nvGrpSpPr>
+      <p:grpSpPr>
+        <a:xfrm>
+          <a:off x="0" y="0"/>
+          <a:ext cx="0" cy="0"/>
+          <a:chOff x="0" y="0"/>
+          <a:chExt cx="0" cy="0"/>
+        </a:xfrm>
+      </p:grpSpPr>
+      <p:sp>
+        <p:nvSpPr>
+          <p:cNvPr id="207" name="Google Shape;207;p33"/>
+          <p:cNvSpPr txBox="1"/>
+          <p:nvPr>
+            <p:ph type="title"/>
+          </p:nvPr>
+        </p:nvSpPr>
+        <p:spPr>
+          <a:xfrm>
+            <a:off x="311700" y="445025"/>
+            <a:ext cx="8520600" cy="707400"/>
+          </a:xfrm>
+          <a:prstGeom prst="rect">
+            <a:avLst/>
+          </a:prstGeom>
+        </p:spPr>
+        <p:txBody>
+          <a:bodyPr anchorCtr="0" anchor="t" bIns="91425" lIns="91425" spcFirstLastPara="1" rIns="91425" wrap="square" tIns="91425">
+            <a:noAutofit/>
+          </a:bodyPr>
+          <a:lstStyle/>
+          <a:p>
+            <a:pPr indent="0" lvl="0" marL="0" rtl="0" algn="l">
+              <a:spcBef>
+                <a:spcPts val="0"/>
+              </a:spcBef>
+              <a:spcAft>
+                <a:spcPts val="0"/>
+              </a:spcAft>
+              <a:buNone/>
+            </a:pPr>
+            <a:r>
+              <a:rPr b="0" lang="en">
+                <a:latin typeface="Roboto Medium"/>
+                <a:ea typeface="Roboto Medium"/>
+                <a:cs typeface="Roboto Medium"/>
+                <a:sym typeface="Roboto Medium"/>
+              </a:rPr>
+              <a:t>Th</a:t>
+            </a:r>
+            <a:r>
+              <a:rPr b="0" lang="en">
+                <a:latin typeface="Roboto Medium"/>
+                <a:ea typeface="Roboto Medium"/>
+                <a:cs typeface="Roboto Medium"/>
+                <a:sym typeface="Roboto Medium"/>
+              </a:rPr>
+              <a:t>iết kế mô hình</a:t>
+            </a:r>
+            <a:endParaRPr b="0">
+              <a:latin typeface="Roboto Medium"/>
+              <a:ea typeface="Roboto Medium"/>
+              <a:cs typeface="Roboto Medium"/>
+              <a:sym typeface="Roboto Medium"/>
+            </a:endParaRPr>
+          </a:p>
+        </p:txBody>
+      </p:sp>
+      <p:sp>
+        <p:nvSpPr>
+          <p:cNvPr id="208" name="Google Shape;208;p33"/>
+          <p:cNvSpPr txBox="1"/>
+          <p:nvPr>
+            <p:ph idx="12" type="sldNum"/>
+          </p:nvPr>
+        </p:nvSpPr>
+        <p:spPr>
+          <a:xfrm>
+            <a:off x="8472458" y="4663217"/>
+            <a:ext cx="548700" cy="393600"/>
+          </a:xfrm>
+          <a:prstGeom prst="rect">
+            <a:avLst/>
+          </a:prstGeom>
+        </p:spPr>
+        <p:txBody>
+          <a:bodyPr anchorCtr="0" anchor="ctr" bIns="91425" lIns="91425" spcFirstLastPara="1" rIns="91425" wrap="square" tIns="91425">
+            <a:noAutofit/>
+          </a:bodyPr>
+          <a:lstStyle/>
+          <a:p>
+            <a:pPr indent="0" lvl="0" marL="0" rtl="0" algn="r">
+              <a:spcBef>
+                <a:spcPts val="0"/>
+              </a:spcBef>
+              <a:spcAft>
+                <a:spcPts val="0"/>
+              </a:spcAft>
+              <a:buNone/>
+            </a:pPr>
+            <a:fld id="{00000000-1234-1234-1234-123412341234}" type="slidenum">
+              <a:rPr lang="en">
+                <a:latin typeface="Open Sans"/>
+                <a:ea typeface="Open Sans"/>
+                <a:cs typeface="Open Sans"/>
+                <a:sym typeface="Open Sans"/>
+              </a:rPr>
+              <a:t>‹#›</a:t>
+            </a:fld>
+            <a:endParaRPr>
+              <a:latin typeface="Open Sans"/>
+              <a:ea typeface="Open Sans"/>
+              <a:cs typeface="Open Sans"/>
+              <a:sym typeface="Open Sans"/>
+            </a:endParaRPr>
+          </a:p>
+        </p:txBody>
+      </p:sp>
+      <p:sp>
+        <p:nvSpPr>
+          <p:cNvPr id="209" name="Google Shape;209;p33"/>
           <p:cNvSpPr/>
           <p:nvPr/>
         </p:nvSpPr>
@@ -11264,7 +11686,7 @@
       </p:sp>
       <p:sp>
         <p:nvSpPr>
-          <p:cNvPr id="201" name="Google Shape;201;p32"/>
+          <p:cNvPr id="210" name="Google Shape;210;p33"/>
           <p:cNvSpPr/>
           <p:nvPr/>
         </p:nvSpPr>
@@ -11316,7 +11738,7 @@
       </p:sp>
       <p:sp>
         <p:nvSpPr>
-          <p:cNvPr id="202" name="Google Shape;202;p32"/>
+          <p:cNvPr id="211" name="Google Shape;211;p33"/>
           <p:cNvSpPr/>
           <p:nvPr/>
         </p:nvSpPr>
@@ -11368,7 +11790,7 @@
       </p:sp>
       <p:sp>
         <p:nvSpPr>
-          <p:cNvPr id="203" name="Google Shape;203;p32"/>
+          <p:cNvPr id="212" name="Google Shape;212;p33"/>
           <p:cNvSpPr/>
           <p:nvPr/>
         </p:nvSpPr>
@@ -11420,7 +11842,7 @@
       </p:sp>
       <p:sp>
         <p:nvSpPr>
-          <p:cNvPr id="204" name="Google Shape;204;p32"/>
+          <p:cNvPr id="213" name="Google Shape;213;p33"/>
           <p:cNvSpPr/>
           <p:nvPr/>
         </p:nvSpPr>
@@ -11480,7 +11902,7 @@
       </p:sp>
       <p:sp>
         <p:nvSpPr>
-          <p:cNvPr id="205" name="Google Shape;205;p32"/>
+          <p:cNvPr id="214" name="Google Shape;214;p33"/>
           <p:cNvSpPr/>
           <p:nvPr/>
         </p:nvSpPr>
@@ -11540,7 +11962,7 @@
       </p:sp>
       <p:sp>
         <p:nvSpPr>
-          <p:cNvPr id="206" name="Google Shape;206;p32"/>
+          <p:cNvPr id="215" name="Google Shape;215;p33"/>
           <p:cNvSpPr/>
           <p:nvPr/>
         </p:nvSpPr>
@@ -11600,7 +12022,7 @@
       </p:sp>
       <p:sp>
         <p:nvSpPr>
-          <p:cNvPr id="207" name="Google Shape;207;p32"/>
+          <p:cNvPr id="216" name="Google Shape;216;p33"/>
           <p:cNvSpPr/>
           <p:nvPr/>
         </p:nvSpPr>
@@ -11660,7 +12082,7 @@
       </p:sp>
       <p:sp>
         <p:nvSpPr>
-          <p:cNvPr id="208" name="Google Shape;208;p32"/>
+          <p:cNvPr id="217" name="Google Shape;217;p33"/>
           <p:cNvSpPr/>
           <p:nvPr/>
         </p:nvSpPr>
@@ -11712,7 +12134,7 @@
       </p:sp>
       <p:sp>
         <p:nvSpPr>
-          <p:cNvPr id="209" name="Google Shape;209;p32"/>
+          <p:cNvPr id="218" name="Google Shape;218;p33"/>
           <p:cNvSpPr/>
           <p:nvPr/>
         </p:nvSpPr>
@@ -11772,7 +12194,7 @@
       </p:sp>
       <p:sp>
         <p:nvSpPr>
-          <p:cNvPr id="210" name="Google Shape;210;p32"/>
+          <p:cNvPr id="219" name="Google Shape;219;p33"/>
           <p:cNvSpPr/>
           <p:nvPr/>
         </p:nvSpPr>
@@ -11824,7 +12246,7 @@
       </p:sp>
       <p:sp>
         <p:nvSpPr>
-          <p:cNvPr id="211" name="Google Shape;211;p32"/>
+          <p:cNvPr id="220" name="Google Shape;220;p33"/>
           <p:cNvSpPr/>
           <p:nvPr/>
         </p:nvSpPr>
@@ -11882,12 +12304,12 @@
 </p:sld>
 </file>
 
-<file path=ppt/slides/slide21.xml><?xml version="1.0" encoding="utf-8"?>
+<file path=ppt/slides/slide22.xml><?xml version="1.0" encoding="utf-8"?>
 <p:sld xmlns:a="http://schemas.openxmlformats.org/drawingml/2006/main" xmlns:r="http://schemas.openxmlformats.org/officeDocument/2006/relationships" xmlns:mc="http://schemas.openxmlformats.org/markup-compatibility/2006" xmlns:mv="urn:schemas-microsoft-com:mac:vml" xmlns:p="http://schemas.openxmlformats.org/presentationml/2006/main" xmlns:c="http://schemas.openxmlformats.org/drawingml/2006/chart" xmlns:dgm="http://schemas.openxmlformats.org/drawingml/2006/diagram" xmlns:o="urn:schemas-microsoft-com:office:office" xmlns:v="urn:schemas-microsoft-com:vml" xmlns:pvml="urn:schemas-microsoft-com:office:powerpoint" xmlns:com="http://schemas.openxmlformats.org/drawingml/2006/compatibility" xmlns:p14="http://schemas.microsoft.com/office/powerpoint/2010/main" xmlns:p15="http://schemas.microsoft.com/office/powerpoint/2012/main">
   <p:cSld>
     <p:spTree>
       <p:nvGrpSpPr>
-        <p:cNvPr id="215" name="Shape 215"/>
+        <p:cNvPr id="224" name="Shape 224"/>
         <p:cNvGrpSpPr/>
         <p:nvPr/>
       </p:nvGrpSpPr>
@@ -11901,7 +12323,7 @@
       </p:grpSpPr>
       <p:sp>
         <p:nvSpPr>
-          <p:cNvPr id="216" name="Google Shape;216;p33"/>
+          <p:cNvPr id="225" name="Google Shape;225;p34"/>
           <p:cNvSpPr txBox="1"/>
           <p:nvPr>
             <p:ph type="title"/>
@@ -11960,7 +12382,7 @@
       </p:sp>
       <p:sp>
         <p:nvSpPr>
-          <p:cNvPr id="217" name="Google Shape;217;p33"/>
+          <p:cNvPr id="226" name="Google Shape;226;p34"/>
           <p:cNvSpPr txBox="1"/>
           <p:nvPr>
             <p:ph idx="1" type="body"/>
@@ -12061,7 +12483,7 @@
       </p:sp>
       <p:sp>
         <p:nvSpPr>
-          <p:cNvPr id="218" name="Google Shape;218;p33"/>
+          <p:cNvPr id="227" name="Google Shape;227;p34"/>
           <p:cNvSpPr txBox="1"/>
           <p:nvPr>
             <p:ph idx="12" type="sldNum"/>
@@ -12117,12 +12539,12 @@
 </p:sld>
 </file>
 
-<file path=ppt/slides/slide22.xml><?xml version="1.0" encoding="utf-8"?>
+<file path=ppt/slides/slide23.xml><?xml version="1.0" encoding="utf-8"?>
 <p:sld xmlns:a="http://schemas.openxmlformats.org/drawingml/2006/main" xmlns:r="http://schemas.openxmlformats.org/officeDocument/2006/relationships" xmlns:mc="http://schemas.openxmlformats.org/markup-compatibility/2006" xmlns:mv="urn:schemas-microsoft-com:mac:vml" xmlns:p="http://schemas.openxmlformats.org/presentationml/2006/main" xmlns:c="http://schemas.openxmlformats.org/drawingml/2006/chart" xmlns:dgm="http://schemas.openxmlformats.org/drawingml/2006/diagram" xmlns:o="urn:schemas-microsoft-com:office:office" xmlns:v="urn:schemas-microsoft-com:vml" xmlns:pvml="urn:schemas-microsoft-com:office:powerpoint" xmlns:com="http://schemas.openxmlformats.org/drawingml/2006/compatibility" xmlns:p14="http://schemas.microsoft.com/office/powerpoint/2010/main" xmlns:p15="http://schemas.microsoft.com/office/powerpoint/2012/main">
   <p:cSld>
     <p:spTree>
       <p:nvGrpSpPr>
-        <p:cNvPr id="222" name="Shape 222"/>
+        <p:cNvPr id="231" name="Shape 231"/>
         <p:cNvGrpSpPr/>
         <p:nvPr/>
       </p:nvGrpSpPr>
@@ -12136,7 +12558,7 @@
       </p:grpSpPr>
       <p:sp>
         <p:nvSpPr>
-          <p:cNvPr id="223" name="Google Shape;223;p34"/>
+          <p:cNvPr id="232" name="Google Shape;232;p35"/>
           <p:cNvSpPr txBox="1"/>
           <p:nvPr>
             <p:ph type="title"/>
@@ -12206,7 +12628,7 @@
       </p:sp>
       <p:sp>
         <p:nvSpPr>
-          <p:cNvPr id="224" name="Google Shape;224;p34"/>
+          <p:cNvPr id="233" name="Google Shape;233;p35"/>
           <p:cNvSpPr txBox="1"/>
           <p:nvPr>
             <p:ph idx="12" type="sldNum"/>
@@ -12256,7 +12678,7 @@
       </p:sp>
       <p:pic>
         <p:nvPicPr>
-          <p:cNvPr id="225" name="Google Shape;225;p34"/>
+          <p:cNvPr id="234" name="Google Shape;234;p35"/>
           <p:cNvPicPr preferRelativeResize="0"/>
           <p:nvPr/>
         </p:nvPicPr>
@@ -12270,8 +12692,8 @@
         </p:blipFill>
         <p:spPr>
           <a:xfrm>
-            <a:off x="1003625" y="1306125"/>
-            <a:ext cx="7136750" cy="3568375"/>
+            <a:off x="1604963" y="1473075"/>
+            <a:ext cx="5934075" cy="3009900"/>
           </a:xfrm>
           <a:prstGeom prst="rect">
             <a:avLst/>
@@ -12290,12 +12712,12 @@
 </p:sld>
 </file>
 
-<file path=ppt/slides/slide23.xml><?xml version="1.0" encoding="utf-8"?>
+<file path=ppt/slides/slide24.xml><?xml version="1.0" encoding="utf-8"?>
 <p:sld xmlns:a="http://schemas.openxmlformats.org/drawingml/2006/main" xmlns:r="http://schemas.openxmlformats.org/officeDocument/2006/relationships" xmlns:mc="http://schemas.openxmlformats.org/markup-compatibility/2006" xmlns:mv="urn:schemas-microsoft-com:mac:vml" xmlns:p="http://schemas.openxmlformats.org/presentationml/2006/main" xmlns:c="http://schemas.openxmlformats.org/drawingml/2006/chart" xmlns:dgm="http://schemas.openxmlformats.org/drawingml/2006/diagram" xmlns:o="urn:schemas-microsoft-com:office:office" xmlns:v="urn:schemas-microsoft-com:vml" xmlns:pvml="urn:schemas-microsoft-com:office:powerpoint" xmlns:com="http://schemas.openxmlformats.org/drawingml/2006/compatibility" xmlns:p14="http://schemas.microsoft.com/office/powerpoint/2010/main" xmlns:p15="http://schemas.microsoft.com/office/powerpoint/2012/main">
   <p:cSld>
     <p:spTree>
       <p:nvGrpSpPr>
-        <p:cNvPr id="229" name="Shape 229"/>
+        <p:cNvPr id="238" name="Shape 238"/>
         <p:cNvGrpSpPr/>
         <p:nvPr/>
       </p:nvGrpSpPr>
@@ -12309,7 +12731,7 @@
       </p:grpSpPr>
       <p:sp>
         <p:nvSpPr>
-          <p:cNvPr id="230" name="Google Shape;230;p35"/>
+          <p:cNvPr id="239" name="Google Shape;239;p36"/>
           <p:cNvSpPr txBox="1"/>
           <p:nvPr>
             <p:ph type="title"/>
@@ -12399,7 +12821,7 @@
       </p:sp>
       <p:sp>
         <p:nvSpPr>
-          <p:cNvPr id="231" name="Google Shape;231;p35"/>
+          <p:cNvPr id="240" name="Google Shape;240;p36"/>
           <p:cNvSpPr txBox="1"/>
           <p:nvPr>
             <p:ph idx="12" type="sldNum"/>
@@ -12449,7 +12871,7 @@
       </p:sp>
       <p:pic>
         <p:nvPicPr>
-          <p:cNvPr id="232" name="Google Shape;232;p35"/>
+          <p:cNvPr id="241" name="Google Shape;241;p36"/>
           <p:cNvPicPr preferRelativeResize="0"/>
           <p:nvPr/>
         </p:nvPicPr>
@@ -12463,8 +12885,8 @@
         </p:blipFill>
         <p:spPr>
           <a:xfrm>
-            <a:off x="2398238" y="911250"/>
-            <a:ext cx="4347524" cy="3994125"/>
+            <a:off x="2395375" y="779375"/>
+            <a:ext cx="4353249" cy="4059325"/>
           </a:xfrm>
           <a:prstGeom prst="rect">
             <a:avLst/>
@@ -12483,12 +12905,12 @@
 </p:sld>
 </file>
 
-<file path=ppt/slides/slide24.xml><?xml version="1.0" encoding="utf-8"?>
+<file path=ppt/slides/slide25.xml><?xml version="1.0" encoding="utf-8"?>
 <p:sld xmlns:a="http://schemas.openxmlformats.org/drawingml/2006/main" xmlns:r="http://schemas.openxmlformats.org/officeDocument/2006/relationships" xmlns:mc="http://schemas.openxmlformats.org/markup-compatibility/2006" xmlns:mv="urn:schemas-microsoft-com:mac:vml" xmlns:p="http://schemas.openxmlformats.org/presentationml/2006/main" xmlns:c="http://schemas.openxmlformats.org/drawingml/2006/chart" xmlns:dgm="http://schemas.openxmlformats.org/drawingml/2006/diagram" xmlns:o="urn:schemas-microsoft-com:office:office" xmlns:v="urn:schemas-microsoft-com:vml" xmlns:pvml="urn:schemas-microsoft-com:office:powerpoint" xmlns:com="http://schemas.openxmlformats.org/drawingml/2006/compatibility" xmlns:p14="http://schemas.microsoft.com/office/powerpoint/2010/main" xmlns:p15="http://schemas.microsoft.com/office/powerpoint/2012/main">
   <p:cSld>
     <p:spTree>
       <p:nvGrpSpPr>
-        <p:cNvPr id="236" name="Shape 236"/>
+        <p:cNvPr id="245" name="Shape 245"/>
         <p:cNvGrpSpPr/>
         <p:nvPr/>
       </p:nvGrpSpPr>
@@ -12502,7 +12924,122 @@
       </p:grpSpPr>
       <p:sp>
         <p:nvSpPr>
-          <p:cNvPr id="237" name="Google Shape;237;p36"/>
+          <p:cNvPr id="246" name="Google Shape;246;p37"/>
+          <p:cNvSpPr txBox="1"/>
+          <p:nvPr>
+            <p:ph idx="1" type="body"/>
+          </p:nvPr>
+        </p:nvSpPr>
+        <p:spPr>
+          <a:xfrm>
+            <a:off x="311700" y="1266325"/>
+            <a:ext cx="8520600" cy="3302700"/>
+          </a:xfrm>
+          <a:prstGeom prst="rect">
+            <a:avLst/>
+          </a:prstGeom>
+        </p:spPr>
+        <p:txBody>
+          <a:bodyPr anchorCtr="0" anchor="t" bIns="91425" lIns="91425" spcFirstLastPara="1" rIns="91425" wrap="square" tIns="91425">
+            <a:noAutofit/>
+          </a:bodyPr>
+          <a:lstStyle/>
+          <a:p>
+            <a:pPr indent="-342900" lvl="0" marL="457200" rtl="0" algn="l">
+              <a:spcBef>
+                <a:spcPts val="0"/>
+              </a:spcBef>
+              <a:spcAft>
+                <a:spcPts val="0"/>
+              </a:spcAft>
+              <a:buSzPts val="1800"/>
+              <a:buChar char="●"/>
+            </a:pPr>
+            <a:r>
+              <a:rPr lang="en"/>
+              <a:t>C</a:t>
+            </a:r>
+            <a:r>
+              <a:rPr lang="en"/>
+              <a:t>ách c</a:t>
+            </a:r>
+            <a:r>
+              <a:rPr lang="en"/>
+              <a:t>rawl dữ liệu hiệu quả</a:t>
+            </a:r>
+            <a:endParaRPr/>
+          </a:p>
+          <a:p>
+            <a:pPr indent="-342900" lvl="0" marL="457200" rtl="0" algn="l">
+              <a:spcBef>
+                <a:spcPts val="0"/>
+              </a:spcBef>
+              <a:spcAft>
+                <a:spcPts val="0"/>
+              </a:spcAft>
+              <a:buSzPts val="1800"/>
+              <a:buChar char="●"/>
+            </a:pPr>
+            <a:r>
+              <a:rPr lang="en"/>
+              <a:t>Sử dụng một số đặc trưng cơ bản của nội dung văn bản để phân loại văn bản</a:t>
+            </a:r>
+            <a:endParaRPr/>
+          </a:p>
+          <a:p>
+            <a:pPr indent="-342900" lvl="0" marL="457200" rtl="0" algn="l">
+              <a:spcBef>
+                <a:spcPts val="0"/>
+              </a:spcBef>
+              <a:spcAft>
+                <a:spcPts val="0"/>
+              </a:spcAft>
+              <a:buSzPts val="1800"/>
+              <a:buChar char="●"/>
+            </a:pPr>
+            <a:r>
+              <a:rPr lang="en"/>
+              <a:t>Sử dụng pipeline để huấn luyện và kiểm thử trên các mô hình</a:t>
+            </a:r>
+            <a:endParaRPr/>
+          </a:p>
+          <a:p>
+            <a:pPr indent="-342900" lvl="0" marL="457200" rtl="0" algn="l">
+              <a:spcBef>
+                <a:spcPts val="0"/>
+              </a:spcBef>
+              <a:spcAft>
+                <a:spcPts val="0"/>
+              </a:spcAft>
+              <a:buSzPts val="1800"/>
+              <a:buChar char="●"/>
+            </a:pPr>
+            <a:r>
+              <a:rPr lang="en"/>
+              <a:t>Sử dụng, tổ chức lưu trữ với github</a:t>
+            </a:r>
+            <a:endParaRPr/>
+          </a:p>
+          <a:p>
+            <a:pPr indent="0" lvl="0" marL="0" rtl="0" algn="l">
+              <a:spcBef>
+                <a:spcPts val="1600"/>
+              </a:spcBef>
+              <a:spcAft>
+                <a:spcPts val="1600"/>
+              </a:spcAft>
+              <a:buNone/>
+            </a:pPr>
+            <a:r>
+              <a:t/>
+            </a:r>
+            <a:endParaRPr/>
+          </a:p>
+        </p:txBody>
+      </p:sp>
+      <p:sp>
+        <p:nvSpPr>
+          <p:cNvPr id="247" name="Google Shape;247;p37"/>
           <p:cNvSpPr txBox="1"/>
           <p:nvPr>
             <p:ph type="title"/>
@@ -12570,114 +13107,7 @@
       </p:sp>
       <p:sp>
         <p:nvSpPr>
-          <p:cNvPr id="238" name="Google Shape;238;p36"/>
-          <p:cNvSpPr txBox="1"/>
-          <p:nvPr>
-            <p:ph idx="1" type="body"/>
-          </p:nvPr>
-        </p:nvSpPr>
-        <p:spPr>
-          <a:xfrm>
-            <a:off x="311700" y="1266325"/>
-            <a:ext cx="8520600" cy="3302700"/>
-          </a:xfrm>
-          <a:prstGeom prst="rect">
-            <a:avLst/>
-          </a:prstGeom>
-        </p:spPr>
-        <p:txBody>
-          <a:bodyPr anchorCtr="0" anchor="t" bIns="91425" lIns="91425" spcFirstLastPara="1" rIns="91425" wrap="square" tIns="91425">
-            <a:noAutofit/>
-          </a:bodyPr>
-          <a:lstStyle/>
-          <a:p>
-            <a:pPr indent="-342900" lvl="0" marL="457200" rtl="0" algn="l">
-              <a:spcBef>
-                <a:spcPts val="0"/>
-              </a:spcBef>
-              <a:spcAft>
-                <a:spcPts val="0"/>
-              </a:spcAft>
-              <a:buSzPts val="1800"/>
-              <a:buChar char="●"/>
-            </a:pPr>
-            <a:r>
-              <a:rPr lang="en"/>
-              <a:t>Sử dụng pipeline để huấn luyện và kiểm thử trên các mô hình</a:t>
-            </a:r>
-            <a:endParaRPr/>
-          </a:p>
-          <a:p>
-            <a:pPr indent="-342900" lvl="0" marL="457200" rtl="0" algn="l">
-              <a:spcBef>
-                <a:spcPts val="0"/>
-              </a:spcBef>
-              <a:spcAft>
-                <a:spcPts val="0"/>
-              </a:spcAft>
-              <a:buSzPts val="1800"/>
-              <a:buChar char="●"/>
-            </a:pPr>
-            <a:r>
-              <a:rPr lang="en"/>
-              <a:t>Sử dụng một số đặc trưng cơ bản của nội dung văn bản để phân loại văn bản</a:t>
-            </a:r>
-            <a:endParaRPr/>
-          </a:p>
-          <a:p>
-            <a:pPr indent="-342900" lvl="0" marL="457200" rtl="0" algn="l">
-              <a:spcBef>
-                <a:spcPts val="0"/>
-              </a:spcBef>
-              <a:spcAft>
-                <a:spcPts val="0"/>
-              </a:spcAft>
-              <a:buSzPts val="1800"/>
-              <a:buChar char="●"/>
-            </a:pPr>
-            <a:r>
-              <a:rPr lang="en"/>
-              <a:t>Crawl dữ liệu</a:t>
-            </a:r>
-            <a:endParaRPr/>
-          </a:p>
-          <a:p>
-            <a:pPr indent="-342900" lvl="0" marL="457200" rtl="0" algn="l">
-              <a:spcBef>
-                <a:spcPts val="0"/>
-              </a:spcBef>
-              <a:spcAft>
-                <a:spcPts val="0"/>
-              </a:spcAft>
-              <a:buSzPts val="1800"/>
-              <a:buChar char="●"/>
-            </a:pPr>
-            <a:r>
-              <a:rPr lang="en"/>
-              <a:t>Sử dụng, tổ chức lưu trữ với github</a:t>
-            </a:r>
-            <a:endParaRPr/>
-          </a:p>
-          <a:p>
-            <a:pPr indent="0" lvl="0" marL="0" rtl="0" algn="l">
-              <a:spcBef>
-                <a:spcPts val="1600"/>
-              </a:spcBef>
-              <a:spcAft>
-                <a:spcPts val="1600"/>
-              </a:spcAft>
-              <a:buNone/>
-            </a:pPr>
-            <a:r>
-              <a:t/>
-            </a:r>
-            <a:endParaRPr/>
-          </a:p>
-        </p:txBody>
-      </p:sp>
-      <p:sp>
-        <p:nvSpPr>
-          <p:cNvPr id="239" name="Google Shape;239;p36"/>
+          <p:cNvPr id="248" name="Google Shape;248;p37"/>
           <p:cNvSpPr txBox="1"/>
           <p:nvPr>
             <p:ph idx="12" type="sldNum"/>
@@ -12733,12 +13163,12 @@
 </p:sld>
 </file>
 
-<file path=ppt/slides/slide25.xml><?xml version="1.0" encoding="utf-8"?>
+<file path=ppt/slides/slide26.xml><?xml version="1.0" encoding="utf-8"?>
 <p:sld xmlns:a="http://schemas.openxmlformats.org/drawingml/2006/main" xmlns:r="http://schemas.openxmlformats.org/officeDocument/2006/relationships" xmlns:mc="http://schemas.openxmlformats.org/markup-compatibility/2006" xmlns:mv="urn:schemas-microsoft-com:mac:vml" xmlns:p="http://schemas.openxmlformats.org/presentationml/2006/main" xmlns:c="http://schemas.openxmlformats.org/drawingml/2006/chart" xmlns:dgm="http://schemas.openxmlformats.org/drawingml/2006/diagram" xmlns:o="urn:schemas-microsoft-com:office:office" xmlns:v="urn:schemas-microsoft-com:vml" xmlns:pvml="urn:schemas-microsoft-com:office:powerpoint" xmlns:com="http://schemas.openxmlformats.org/drawingml/2006/compatibility" xmlns:p14="http://schemas.microsoft.com/office/powerpoint/2010/main" xmlns:p15="http://schemas.microsoft.com/office/powerpoint/2012/main">
   <p:cSld>
     <p:spTree>
       <p:nvGrpSpPr>
-        <p:cNvPr id="243" name="Shape 243"/>
+        <p:cNvPr id="252" name="Shape 252"/>
         <p:cNvGrpSpPr/>
         <p:nvPr/>
       </p:nvGrpSpPr>
@@ -12752,7 +13182,7 @@
       </p:grpSpPr>
       <p:sp>
         <p:nvSpPr>
-          <p:cNvPr id="244" name="Google Shape;244;p37"/>
+          <p:cNvPr id="253" name="Google Shape;253;p38"/>
           <p:cNvSpPr txBox="1"/>
           <p:nvPr>
             <p:ph idx="12" type="sldNum"/>
@@ -12802,7 +13232,7 @@
       </p:sp>
       <p:sp>
         <p:nvSpPr>
-          <p:cNvPr id="245" name="Google Shape;245;p37"/>
+          <p:cNvPr id="254" name="Google Shape;254;p38"/>
           <p:cNvSpPr txBox="1"/>
           <p:nvPr/>
         </p:nvSpPr>
@@ -12968,7 +13398,7 @@
             </a:r>
             <a:r>
               <a:rPr lang="en"/>
-              <a:t>Dựa vào nội dung của 1 văn bản tin tức, dự đoán xem đây là tin tức thuộc thể loại nào?</a:t>
+              <a:t>Dựa vào nội dung của 1 văn bản tin tức, dự đoán xem đây là văn bản thuộc thể loại nào?</a:t>
             </a:r>
             <a:endParaRPr/>
           </a:p>
@@ -13018,7 +13448,7 @@
             </a:pPr>
             <a:r>
               <a:rPr lang="en"/>
-              <a:t>Phần nào hỗ trợ việc lọc các nội dung.</a:t>
+              <a:t>Phần nào hỗ trợ việc lọc các nội dung</a:t>
             </a:r>
             <a:endParaRPr/>
           </a:p>
@@ -13821,7 +14251,7 @@
         <p:spPr>
           <a:xfrm>
             <a:off x="311700" y="1266325"/>
-            <a:ext cx="8520600" cy="3302700"/>
+            <a:ext cx="3752700" cy="3302700"/>
           </a:xfrm>
           <a:prstGeom prst="rect">
             <a:avLst/>
@@ -13920,6 +14350,34 @@
           </a:p>
         </p:txBody>
       </p:sp>
+      <p:pic>
+        <p:nvPicPr>
+          <p:cNvPr id="113" name="Google Shape;113;p19"/>
+          <p:cNvPicPr preferRelativeResize="0"/>
+          <p:nvPr/>
+        </p:nvPicPr>
+        <p:blipFill>
+          <a:blip r:embed="rId3">
+            <a:alphaModFix/>
+          </a:blip>
+          <a:stretch>
+            <a:fillRect/>
+          </a:stretch>
+        </p:blipFill>
+        <p:spPr>
+          <a:xfrm>
+            <a:off x="4120875" y="1904300"/>
+            <a:ext cx="4774799" cy="1472073"/>
+          </a:xfrm>
+          <a:prstGeom prst="rect">
+            <a:avLst/>
+          </a:prstGeom>
+          <a:noFill/>
+          <a:ln>
+            <a:noFill/>
+          </a:ln>
+        </p:spPr>
+      </p:pic>
     </p:spTree>
   </p:cSld>
   <p:clrMapOvr>
@@ -13933,7 +14391,7 @@
   <p:cSld>
     <p:spTree>
       <p:nvGrpSpPr>
-        <p:cNvPr id="116" name="Shape 116"/>
+        <p:cNvPr id="117" name="Shape 117"/>
         <p:cNvGrpSpPr/>
         <p:nvPr/>
       </p:nvGrpSpPr>
@@ -13947,7 +14405,7 @@
       </p:grpSpPr>
       <p:sp>
         <p:nvSpPr>
-          <p:cNvPr id="117" name="Google Shape;117;p20"/>
+          <p:cNvPr id="118" name="Google Shape;118;p20"/>
           <p:cNvSpPr txBox="1"/>
           <p:nvPr>
             <p:ph type="title"/>
@@ -14006,7 +14464,7 @@
       </p:sp>
       <p:sp>
         <p:nvSpPr>
-          <p:cNvPr id="118" name="Google Shape;118;p20"/>
+          <p:cNvPr id="119" name="Google Shape;119;p20"/>
           <p:cNvSpPr txBox="1"/>
           <p:nvPr>
             <p:ph idx="12" type="sldNum"/>
@@ -14056,7 +14514,7 @@
       </p:sp>
       <p:sp>
         <p:nvSpPr>
-          <p:cNvPr id="119" name="Google Shape;119;p20"/>
+          <p:cNvPr id="120" name="Google Shape;120;p20"/>
           <p:cNvSpPr txBox="1"/>
           <p:nvPr/>
         </p:nvSpPr>
@@ -14135,7 +14593,7 @@
                   <a:schemeClr val="dk2"/>
                 </a:solidFill>
               </a:rPr>
-              <a:t>Độ dài chuỗi trung bình của title ở mỗi thể loại</a:t>
+              <a:t>Độ dài chuỗi trung bình của tiêu đề (title) ở mỗi thể loại</a:t>
             </a:r>
             <a:endParaRPr sz="2000">
               <a:solidFill>
@@ -14290,7 +14748,7 @@
                   <a:schemeClr val="dk2"/>
                 </a:solidFill>
               </a:rPr>
-              <a:t>Số lượng dấu cảm thán (!, ?) trung trong 1 văn bản</a:t>
+              <a:t>Số lượng dấu cảm thán (!, ?) trung bình trong 1 văn bản của từng thể loại</a:t>
             </a:r>
             <a:endParaRPr sz="2000">
               <a:solidFill>
@@ -14313,7 +14771,7 @@
   <p:cSld>
     <p:spTree>
       <p:nvGrpSpPr>
-        <p:cNvPr id="123" name="Shape 123"/>
+        <p:cNvPr id="124" name="Shape 124"/>
         <p:cNvGrpSpPr/>
         <p:nvPr/>
       </p:nvGrpSpPr>
@@ -14327,7 +14785,7 @@
       </p:grpSpPr>
       <p:pic>
         <p:nvPicPr>
-          <p:cNvPr id="124" name="Google Shape;124;p21"/>
+          <p:cNvPr id="125" name="Google Shape;125;p21"/>
           <p:cNvPicPr preferRelativeResize="0"/>
           <p:nvPr/>
         </p:nvPicPr>
@@ -14355,7 +14813,7 @@
       </p:pic>
       <p:sp>
         <p:nvSpPr>
-          <p:cNvPr id="125" name="Google Shape;125;p21"/>
+          <p:cNvPr id="126" name="Google Shape;126;p21"/>
           <p:cNvSpPr txBox="1"/>
           <p:nvPr>
             <p:ph idx="12" type="sldNum"/>

</xml_diff>